<commit_message>
Minor changes and add a last slide explaining the lab for audio processing
</commit_message>
<xml_diff>
--- a/lectures/Lect07_Optim.pptx
+++ b/lectures/Lect07_Optim.pptx
@@ -1,11 +1,11 @@
 
 <file path=ppt/presentation.xml><?xml version="1.0" encoding="utf-8"?>
-<p:presentation xmlns:a="http://schemas.openxmlformats.org/drawingml/2006/main" xmlns:r="http://schemas.openxmlformats.org/officeDocument/2006/relationships" xmlns:p="http://schemas.openxmlformats.org/presentationml/2006/main" autoCompressPictures="0">
+<p:presentation xmlns:a="http://schemas.openxmlformats.org/drawingml/2006/main" xmlns:r="http://schemas.openxmlformats.org/officeDocument/2006/relationships" xmlns:p="http://schemas.openxmlformats.org/presentationml/2006/main" saveSubsetFonts="1" autoCompressPictures="0">
   <p:sldMasterIdLst>
     <p:sldMasterId id="2147483648" r:id="rId1"/>
   </p:sldMasterIdLst>
   <p:notesMasterIdLst>
-    <p:notesMasterId r:id="rId52"/>
+    <p:notesMasterId r:id="rId54"/>
   </p:notesMasterIdLst>
   <p:sldIdLst>
     <p:sldId id="258" r:id="rId2"/>
@@ -58,6 +58,8 @@
     <p:sldId id="460" r:id="rId49"/>
     <p:sldId id="461" r:id="rId50"/>
     <p:sldId id="462" r:id="rId51"/>
+    <p:sldId id="470" r:id="rId52"/>
+    <p:sldId id="469" r:id="rId53"/>
   </p:sldIdLst>
   <p:sldSz cx="12192000" cy="6858000"/>
   <p:notesSz cx="7315200" cy="9601200"/>
@@ -175,10 +177,6 @@
 </p:presentation>
 </file>
 
-<file path=ppt/revisionInfo.xml><?xml version="1.0" encoding="utf-8"?>
-<p1510:revInfo xmlns:a="http://schemas.openxmlformats.org/drawingml/2006/main" xmlns:r="http://schemas.openxmlformats.org/officeDocument/2006/relationships" xmlns:p1510="http://schemas.microsoft.com/office/powerpoint/2015/10/main"/>
-</file>
-
 <file path=ppt/notesMasters/notesMaster1.xml><?xml version="1.0" encoding="utf-8"?>
 <p:notesMaster xmlns:a="http://schemas.openxmlformats.org/drawingml/2006/main" xmlns:r="http://schemas.openxmlformats.org/officeDocument/2006/relationships" xmlns:p="http://schemas.openxmlformats.org/presentationml/2006/main">
   <p:cSld>
@@ -261,7 +259,7 @@
           <a:p>
             <a:fld id="{B7D6DDD3-D7E9-488B-B626-1E8285E424D8}" type="datetimeFigureOut">
               <a:rPr lang="en-US" smtClean="0"/>
-              <a:t>10/12/2017</a:t>
+              <a:t>3/3/18</a:t>
             </a:fld>
             <a:endParaRPr lang="en-US"/>
           </a:p>
@@ -4172,8 +4170,8 @@
           </a:p>
         </p:txBody>
       </p:sp>
-      <mc:AlternateContent xmlns:mc="http://schemas.openxmlformats.org/markup-compatibility/2006" xmlns:a14="http://schemas.microsoft.com/office/drawing/2010/main">
-        <mc:Choice Requires="a14">
+      <mc:AlternateContent xmlns:mc="http://schemas.openxmlformats.org/markup-compatibility/2006">
+        <mc:Choice xmlns:a14="http://schemas.microsoft.com/office/drawing/2010/main" Requires="a14">
           <p:sp>
             <p:nvSpPr>
               <p:cNvPr id="3" name="Content Placeholder 2"/>
@@ -5064,8 +5062,12 @@
               </a:p>
               <a:p>
                 <a:r>
-                  <a:rPr lang="en-US" dirty="0"/>
-                  <a:t>Gradient is same size as the argument</a:t>
+                  <a:rPr lang="en-US" dirty="0">
+                    <a:solidFill>
+                      <a:srgbClr val="FF0000"/>
+                    </a:solidFill>
+                  </a:rPr>
+                  <a:t>Gradient is same size as the argument!</a:t>
                 </a:r>
               </a:p>
               <a:p>
@@ -5074,7 +5076,7 @@
             </p:txBody>
           </p:sp>
         </mc:Choice>
-        <mc:Fallback xmlns="">
+        <mc:Fallback>
           <p:sp>
             <p:nvSpPr>
               <p:cNvPr id="3" name="Content Placeholder 2"/>
@@ -5089,7 +5091,7 @@
               <a:blipFill>
                 <a:blip r:embed="rId2"/>
                 <a:stretch>
-                  <a:fillRect l="-1455" t="-1549"/>
+                  <a:fillRect l="-1261" t="-1462"/>
                 </a:stretch>
               </a:blipFill>
             </p:spPr>
@@ -7515,8 +7517,8 @@
           </a:p>
         </p:txBody>
       </p:sp>
-      <mc:AlternateContent xmlns:mc="http://schemas.openxmlformats.org/markup-compatibility/2006" xmlns:a14="http://schemas.microsoft.com/office/drawing/2010/main">
-        <mc:Choice Requires="a14">
+      <mc:AlternateContent xmlns:mc="http://schemas.openxmlformats.org/markup-compatibility/2006">
+        <mc:Choice xmlns:a14="http://schemas.microsoft.com/office/drawing/2010/main" Requires="a14">
           <p:sp>
             <p:nvSpPr>
               <p:cNvPr id="3" name="Content Placeholder 2">
@@ -7876,10 +7878,609 @@
                   <a:t> vector</a:t>
                 </a:r>
               </a:p>
+              <a:p>
+                <a:endParaRPr lang="en-US" dirty="0"/>
+              </a:p>
+              <a:p>
+                <a:pPr marL="0" indent="0">
+                  <a:buNone/>
+                </a:pPr>
+                <a14:m>
+                  <m:oMathPara xmlns:m="http://schemas.openxmlformats.org/officeDocument/2006/math">
+                    <m:oMathParaPr>
+                      <m:jc m:val="centerGroup"/>
+                    </m:oMathParaPr>
+                    <m:oMath xmlns:m="http://schemas.openxmlformats.org/officeDocument/2006/math">
+                      <m:f>
+                        <m:fPr>
+                          <m:ctrlPr>
+                            <a:rPr lang="en-US" i="1">
+                              <a:latin typeface="Cambria Math" panose="02040503050406030204" pitchFamily="18" charset="0"/>
+                            </a:rPr>
+                          </m:ctrlPr>
+                        </m:fPr>
+                        <m:num>
+                          <m:r>
+                            <a:rPr lang="en-US" i="1">
+                              <a:latin typeface="Cambria Math" panose="02040503050406030204" pitchFamily="18" charset="0"/>
+                            </a:rPr>
+                            <m:t>𝜕</m:t>
+                          </m:r>
+                          <m:r>
+                            <a:rPr lang="en-US" i="1">
+                              <a:latin typeface="Cambria Math" panose="02040503050406030204" pitchFamily="18" charset="0"/>
+                            </a:rPr>
+                            <m:t>𝐽</m:t>
+                          </m:r>
+                          <m:d>
+                            <m:dPr>
+                              <m:ctrlPr>
+                                <a:rPr lang="en-US" i="1">
+                                  <a:latin typeface="Cambria Math" panose="02040503050406030204" pitchFamily="18" charset="0"/>
+                                </a:rPr>
+                              </m:ctrlPr>
+                            </m:dPr>
+                            <m:e>
+                              <m:r>
+                                <a:rPr lang="en-US" i="1">
+                                  <a:latin typeface="Cambria Math" panose="02040503050406030204" pitchFamily="18" charset="0"/>
+                                </a:rPr>
+                                <m:t>𝑤</m:t>
+                              </m:r>
+                            </m:e>
+                          </m:d>
+                        </m:num>
+                        <m:den>
+                          <m:r>
+                            <a:rPr lang="en-US" i="1">
+                              <a:latin typeface="Cambria Math" panose="02040503050406030204" pitchFamily="18" charset="0"/>
+                            </a:rPr>
+                            <m:t>𝜕</m:t>
+                          </m:r>
+                          <m:r>
+                            <a:rPr lang="en-US" i="1">
+                              <a:latin typeface="Cambria Math" panose="02040503050406030204" pitchFamily="18" charset="0"/>
+                            </a:rPr>
+                            <m:t>𝑎</m:t>
+                          </m:r>
+                        </m:den>
+                      </m:f>
+                      <m:r>
+                        <a:rPr lang="en-US" i="1">
+                          <a:latin typeface="Cambria Math" panose="02040503050406030204" pitchFamily="18" charset="0"/>
+                        </a:rPr>
+                        <m:t>=</m:t>
+                      </m:r>
+                      <m:nary>
+                        <m:naryPr>
+                          <m:chr m:val="∑"/>
+                          <m:limLoc m:val="subSup"/>
+                          <m:ctrlPr>
+                            <a:rPr lang="en-US" i="1">
+                              <a:latin typeface="Cambria Math" panose="02040503050406030204" pitchFamily="18" charset="0"/>
+                            </a:rPr>
+                          </m:ctrlPr>
+                        </m:naryPr>
+                        <m:sub>
+                          <m:r>
+                            <m:rPr>
+                              <m:brk m:alnAt="25"/>
+                            </m:rPr>
+                            <a:rPr lang="en-US" i="1">
+                              <a:latin typeface="Cambria Math" panose="02040503050406030204" pitchFamily="18" charset="0"/>
+                            </a:rPr>
+                            <m:t>𝑖</m:t>
+                          </m:r>
+                          <m:r>
+                            <a:rPr lang="en-US" i="1">
+                              <a:latin typeface="Cambria Math" panose="02040503050406030204" pitchFamily="18" charset="0"/>
+                            </a:rPr>
+                            <m:t>=1</m:t>
+                          </m:r>
+                        </m:sub>
+                        <m:sup>
+                          <m:r>
+                            <a:rPr lang="en-US" i="1">
+                              <a:latin typeface="Cambria Math" panose="02040503050406030204" pitchFamily="18" charset="0"/>
+                            </a:rPr>
+                            <m:t>𝑁</m:t>
+                          </m:r>
+                        </m:sup>
+                        <m:e>
+                          <m:d>
+                            <m:dPr>
+                              <m:ctrlPr>
+                                <a:rPr lang="en-US" i="1">
+                                  <a:latin typeface="Cambria Math" panose="02040503050406030204" pitchFamily="18" charset="0"/>
+                                </a:rPr>
+                              </m:ctrlPr>
+                            </m:dPr>
+                            <m:e>
+                              <m:sSub>
+                                <m:sSubPr>
+                                  <m:ctrlPr>
+                                    <a:rPr lang="en-US" i="1">
+                                      <a:latin typeface="Cambria Math" panose="02040503050406030204" pitchFamily="18" charset="0"/>
+                                    </a:rPr>
+                                  </m:ctrlPr>
+                                </m:sSubPr>
+                                <m:e>
+                                  <m:r>
+                                    <a:rPr lang="en-US" i="1">
+                                      <a:latin typeface="Cambria Math" panose="02040503050406030204" pitchFamily="18" charset="0"/>
+                                    </a:rPr>
+                                    <m:t>𝑦</m:t>
+                                  </m:r>
+                                </m:e>
+                                <m:sub>
+                                  <m:r>
+                                    <a:rPr lang="en-US" i="1">
+                                      <a:latin typeface="Cambria Math" panose="02040503050406030204" pitchFamily="18" charset="0"/>
+                                    </a:rPr>
+                                    <m:t>𝑖</m:t>
+                                  </m:r>
+                                </m:sub>
+                              </m:sSub>
+                              <m:r>
+                                <a:rPr lang="en-US" i="1">
+                                  <a:latin typeface="Cambria Math" panose="02040503050406030204" pitchFamily="18" charset="0"/>
+                                </a:rPr>
+                                <m:t>−</m:t>
+                              </m:r>
+                              <m:r>
+                                <a:rPr lang="en-US" i="1">
+                                  <a:latin typeface="Cambria Math" panose="02040503050406030204" pitchFamily="18" charset="0"/>
+                                </a:rPr>
+                                <m:t>𝑎</m:t>
+                              </m:r>
+                              <m:sSup>
+                                <m:sSupPr>
+                                  <m:ctrlPr>
+                                    <a:rPr lang="en-US" i="1">
+                                      <a:latin typeface="Cambria Math" panose="02040503050406030204" pitchFamily="18" charset="0"/>
+                                    </a:rPr>
+                                  </m:ctrlPr>
+                                </m:sSupPr>
+                                <m:e>
+                                  <m:r>
+                                    <a:rPr lang="en-US" i="1">
+                                      <a:latin typeface="Cambria Math" panose="02040503050406030204" pitchFamily="18" charset="0"/>
+                                    </a:rPr>
+                                    <m:t>𝑒</m:t>
+                                  </m:r>
+                                </m:e>
+                                <m:sup>
+                                  <m:r>
+                                    <a:rPr lang="en-US" i="1">
+                                      <a:latin typeface="Cambria Math" panose="02040503050406030204" pitchFamily="18" charset="0"/>
+                                    </a:rPr>
+                                    <m:t>−</m:t>
+                                  </m:r>
+                                  <m:r>
+                                    <a:rPr lang="en-US" i="1">
+                                      <a:latin typeface="Cambria Math" panose="02040503050406030204" pitchFamily="18" charset="0"/>
+                                    </a:rPr>
+                                    <m:t>𝑏</m:t>
+                                  </m:r>
+                                  <m:sSub>
+                                    <m:sSubPr>
+                                      <m:ctrlPr>
+                                        <a:rPr lang="en-US" i="1">
+                                          <a:latin typeface="Cambria Math" panose="02040503050406030204" pitchFamily="18" charset="0"/>
+                                        </a:rPr>
+                                      </m:ctrlPr>
+                                    </m:sSubPr>
+                                    <m:e>
+                                      <m:r>
+                                        <a:rPr lang="en-US" i="1">
+                                          <a:latin typeface="Cambria Math" panose="02040503050406030204" pitchFamily="18" charset="0"/>
+                                        </a:rPr>
+                                        <m:t>𝑥</m:t>
+                                      </m:r>
+                                    </m:e>
+                                    <m:sub>
+                                      <m:r>
+                                        <a:rPr lang="en-US" i="1">
+                                          <a:latin typeface="Cambria Math" panose="02040503050406030204" pitchFamily="18" charset="0"/>
+                                        </a:rPr>
+                                        <m:t>𝑖</m:t>
+                                      </m:r>
+                                    </m:sub>
+                                  </m:sSub>
+                                </m:sup>
+                              </m:sSup>
+                            </m:e>
+                          </m:d>
+                          <m:r>
+                            <a:rPr lang="en-US" i="1">
+                              <a:latin typeface="Cambria Math" panose="02040503050406030204" pitchFamily="18" charset="0"/>
+                            </a:rPr>
+                            <m:t>(−</m:t>
+                          </m:r>
+                          <m:sSup>
+                            <m:sSupPr>
+                              <m:ctrlPr>
+                                <a:rPr lang="en-US" i="1">
+                                  <a:latin typeface="Cambria Math" panose="02040503050406030204" pitchFamily="18" charset="0"/>
+                                </a:rPr>
+                              </m:ctrlPr>
+                            </m:sSupPr>
+                            <m:e>
+                              <m:r>
+                                <a:rPr lang="en-US" i="1">
+                                  <a:latin typeface="Cambria Math" panose="02040503050406030204" pitchFamily="18" charset="0"/>
+                                </a:rPr>
+                                <m:t>𝑒</m:t>
+                              </m:r>
+                            </m:e>
+                            <m:sup>
+                              <m:r>
+                                <a:rPr lang="en-US" i="1">
+                                  <a:latin typeface="Cambria Math" panose="02040503050406030204" pitchFamily="18" charset="0"/>
+                                </a:rPr>
+                                <m:t>−</m:t>
+                              </m:r>
+                              <m:r>
+                                <a:rPr lang="en-US" i="1">
+                                  <a:latin typeface="Cambria Math" panose="02040503050406030204" pitchFamily="18" charset="0"/>
+                                </a:rPr>
+                                <m:t>𝑏</m:t>
+                              </m:r>
+                              <m:sSub>
+                                <m:sSubPr>
+                                  <m:ctrlPr>
+                                    <a:rPr lang="en-US" i="1">
+                                      <a:latin typeface="Cambria Math" panose="02040503050406030204" pitchFamily="18" charset="0"/>
+                                    </a:rPr>
+                                  </m:ctrlPr>
+                                </m:sSubPr>
+                                <m:e>
+                                  <m:r>
+                                    <a:rPr lang="en-US" i="1">
+                                      <a:latin typeface="Cambria Math" panose="02040503050406030204" pitchFamily="18" charset="0"/>
+                                    </a:rPr>
+                                    <m:t>𝑥</m:t>
+                                  </m:r>
+                                </m:e>
+                                <m:sub>
+                                  <m:r>
+                                    <a:rPr lang="en-US" i="1">
+                                      <a:latin typeface="Cambria Math" panose="02040503050406030204" pitchFamily="18" charset="0"/>
+                                    </a:rPr>
+                                    <m:t>𝑖</m:t>
+                                  </m:r>
+                                </m:sub>
+                              </m:sSub>
+                            </m:sup>
+                          </m:sSup>
+                          <m:r>
+                            <a:rPr lang="en-US" i="1">
+                              <a:latin typeface="Cambria Math" panose="02040503050406030204" pitchFamily="18" charset="0"/>
+                            </a:rPr>
+                            <m:t>)</m:t>
+                          </m:r>
+                        </m:e>
+                      </m:nary>
+                    </m:oMath>
+                    <m:oMath xmlns:m="http://schemas.openxmlformats.org/officeDocument/2006/math">
+                      <m:r>
+                        <a:rPr lang="en-US" i="1">
+                          <a:latin typeface="Cambria Math" panose="02040503050406030204" pitchFamily="18" charset="0"/>
+                        </a:rPr>
+                        <m:t> </m:t>
+                      </m:r>
+                    </m:oMath>
+                    <m:oMath xmlns:m="http://schemas.openxmlformats.org/officeDocument/2006/math">
+                      <m:f>
+                        <m:fPr>
+                          <m:ctrlPr>
+                            <a:rPr lang="en-US" i="1">
+                              <a:latin typeface="Cambria Math" panose="02040503050406030204" pitchFamily="18" charset="0"/>
+                            </a:rPr>
+                          </m:ctrlPr>
+                        </m:fPr>
+                        <m:num>
+                          <m:r>
+                            <a:rPr lang="en-US" i="1">
+                              <a:latin typeface="Cambria Math" panose="02040503050406030204" pitchFamily="18" charset="0"/>
+                            </a:rPr>
+                            <m:t>𝜕</m:t>
+                          </m:r>
+                          <m:r>
+                            <a:rPr lang="en-US" i="1">
+                              <a:latin typeface="Cambria Math" panose="02040503050406030204" pitchFamily="18" charset="0"/>
+                            </a:rPr>
+                            <m:t>𝐽</m:t>
+                          </m:r>
+                          <m:d>
+                            <m:dPr>
+                              <m:ctrlPr>
+                                <a:rPr lang="en-US" i="1">
+                                  <a:latin typeface="Cambria Math" panose="02040503050406030204" pitchFamily="18" charset="0"/>
+                                </a:rPr>
+                              </m:ctrlPr>
+                            </m:dPr>
+                            <m:e>
+                              <m:r>
+                                <a:rPr lang="en-US" i="1">
+                                  <a:latin typeface="Cambria Math" panose="02040503050406030204" pitchFamily="18" charset="0"/>
+                                </a:rPr>
+                                <m:t>𝑤</m:t>
+                              </m:r>
+                            </m:e>
+                          </m:d>
+                        </m:num>
+                        <m:den>
+                          <m:r>
+                            <a:rPr lang="en-US" i="1">
+                              <a:latin typeface="Cambria Math" panose="02040503050406030204" pitchFamily="18" charset="0"/>
+                            </a:rPr>
+                            <m:t>𝜕</m:t>
+                          </m:r>
+                          <m:r>
+                            <a:rPr lang="en-US" i="1">
+                              <a:latin typeface="Cambria Math" panose="02040503050406030204" pitchFamily="18" charset="0"/>
+                            </a:rPr>
+                            <m:t>𝑏</m:t>
+                          </m:r>
+                        </m:den>
+                      </m:f>
+                      <m:r>
+                        <a:rPr lang="en-US" i="1">
+                          <a:latin typeface="Cambria Math" panose="02040503050406030204" pitchFamily="18" charset="0"/>
+                        </a:rPr>
+                        <m:t>=</m:t>
+                      </m:r>
+                      <m:nary>
+                        <m:naryPr>
+                          <m:chr m:val="∑"/>
+                          <m:limLoc m:val="subSup"/>
+                          <m:ctrlPr>
+                            <a:rPr lang="en-US" i="1">
+                              <a:latin typeface="Cambria Math" panose="02040503050406030204" pitchFamily="18" charset="0"/>
+                            </a:rPr>
+                          </m:ctrlPr>
+                        </m:naryPr>
+                        <m:sub>
+                          <m:r>
+                            <m:rPr>
+                              <m:brk m:alnAt="25"/>
+                            </m:rPr>
+                            <a:rPr lang="en-US" i="1">
+                              <a:latin typeface="Cambria Math" panose="02040503050406030204" pitchFamily="18" charset="0"/>
+                            </a:rPr>
+                            <m:t>𝑖</m:t>
+                          </m:r>
+                          <m:r>
+                            <a:rPr lang="en-US" i="1">
+                              <a:latin typeface="Cambria Math" panose="02040503050406030204" pitchFamily="18" charset="0"/>
+                            </a:rPr>
+                            <m:t>=1</m:t>
+                          </m:r>
+                        </m:sub>
+                        <m:sup>
+                          <m:r>
+                            <a:rPr lang="en-US" i="1">
+                              <a:latin typeface="Cambria Math" panose="02040503050406030204" pitchFamily="18" charset="0"/>
+                            </a:rPr>
+                            <m:t>𝑁</m:t>
+                          </m:r>
+                        </m:sup>
+                        <m:e>
+                          <m:d>
+                            <m:dPr>
+                              <m:ctrlPr>
+                                <a:rPr lang="en-US" i="1">
+                                  <a:latin typeface="Cambria Math" panose="02040503050406030204" pitchFamily="18" charset="0"/>
+                                </a:rPr>
+                              </m:ctrlPr>
+                            </m:dPr>
+                            <m:e>
+                              <m:sSub>
+                                <m:sSubPr>
+                                  <m:ctrlPr>
+                                    <a:rPr lang="en-US" i="1">
+                                      <a:latin typeface="Cambria Math" panose="02040503050406030204" pitchFamily="18" charset="0"/>
+                                    </a:rPr>
+                                  </m:ctrlPr>
+                                </m:sSubPr>
+                                <m:e>
+                                  <m:r>
+                                    <a:rPr lang="en-US" i="1">
+                                      <a:latin typeface="Cambria Math" panose="02040503050406030204" pitchFamily="18" charset="0"/>
+                                    </a:rPr>
+                                    <m:t>𝑦</m:t>
+                                  </m:r>
+                                </m:e>
+                                <m:sub>
+                                  <m:r>
+                                    <a:rPr lang="en-US" i="1">
+                                      <a:latin typeface="Cambria Math" panose="02040503050406030204" pitchFamily="18" charset="0"/>
+                                    </a:rPr>
+                                    <m:t>𝑖</m:t>
+                                  </m:r>
+                                </m:sub>
+                              </m:sSub>
+                              <m:r>
+                                <a:rPr lang="en-US" i="1">
+                                  <a:latin typeface="Cambria Math" panose="02040503050406030204" pitchFamily="18" charset="0"/>
+                                </a:rPr>
+                                <m:t>−</m:t>
+                              </m:r>
+                              <m:r>
+                                <a:rPr lang="en-US" i="1">
+                                  <a:latin typeface="Cambria Math" panose="02040503050406030204" pitchFamily="18" charset="0"/>
+                                </a:rPr>
+                                <m:t>𝑎</m:t>
+                              </m:r>
+                              <m:sSup>
+                                <m:sSupPr>
+                                  <m:ctrlPr>
+                                    <a:rPr lang="en-US" i="1">
+                                      <a:latin typeface="Cambria Math" panose="02040503050406030204" pitchFamily="18" charset="0"/>
+                                    </a:rPr>
+                                  </m:ctrlPr>
+                                </m:sSupPr>
+                                <m:e>
+                                  <m:r>
+                                    <a:rPr lang="en-US" i="1">
+                                      <a:latin typeface="Cambria Math" panose="02040503050406030204" pitchFamily="18" charset="0"/>
+                                    </a:rPr>
+                                    <m:t>𝑒</m:t>
+                                  </m:r>
+                                </m:e>
+                                <m:sup>
+                                  <m:r>
+                                    <a:rPr lang="en-US" i="1">
+                                      <a:latin typeface="Cambria Math" panose="02040503050406030204" pitchFamily="18" charset="0"/>
+                                    </a:rPr>
+                                    <m:t>−</m:t>
+                                  </m:r>
+                                  <m:r>
+                                    <a:rPr lang="en-US" i="1">
+                                      <a:latin typeface="Cambria Math" panose="02040503050406030204" pitchFamily="18" charset="0"/>
+                                    </a:rPr>
+                                    <m:t>𝑏</m:t>
+                                  </m:r>
+                                  <m:sSub>
+                                    <m:sSubPr>
+                                      <m:ctrlPr>
+                                        <a:rPr lang="en-US" i="1">
+                                          <a:latin typeface="Cambria Math" panose="02040503050406030204" pitchFamily="18" charset="0"/>
+                                        </a:rPr>
+                                      </m:ctrlPr>
+                                    </m:sSubPr>
+                                    <m:e>
+                                      <m:r>
+                                        <a:rPr lang="en-US" i="1">
+                                          <a:latin typeface="Cambria Math" panose="02040503050406030204" pitchFamily="18" charset="0"/>
+                                        </a:rPr>
+                                        <m:t>𝑥</m:t>
+                                      </m:r>
+                                    </m:e>
+                                    <m:sub>
+                                      <m:r>
+                                        <a:rPr lang="en-US" i="1">
+                                          <a:latin typeface="Cambria Math" panose="02040503050406030204" pitchFamily="18" charset="0"/>
+                                        </a:rPr>
+                                        <m:t>𝑖</m:t>
+                                      </m:r>
+                                    </m:sub>
+                                  </m:sSub>
+                                </m:sup>
+                              </m:sSup>
+                            </m:e>
+                          </m:d>
+                          <m:r>
+                            <a:rPr lang="en-US" i="1">
+                              <a:latin typeface="Cambria Math" panose="02040503050406030204" pitchFamily="18" charset="0"/>
+                            </a:rPr>
+                            <m:t>(</m:t>
+                          </m:r>
+                          <m:r>
+                            <a:rPr lang="en-US" i="1">
+                              <a:latin typeface="Cambria Math" panose="02040503050406030204" pitchFamily="18" charset="0"/>
+                            </a:rPr>
+                            <m:t>𝑎</m:t>
+                          </m:r>
+                          <m:sSub>
+                            <m:sSubPr>
+                              <m:ctrlPr>
+                                <a:rPr lang="en-US" i="1">
+                                  <a:latin typeface="Cambria Math" panose="02040503050406030204" pitchFamily="18" charset="0"/>
+                                </a:rPr>
+                              </m:ctrlPr>
+                            </m:sSubPr>
+                            <m:e>
+                              <m:r>
+                                <a:rPr lang="en-US" i="1">
+                                  <a:latin typeface="Cambria Math" panose="02040503050406030204" pitchFamily="18" charset="0"/>
+                                </a:rPr>
+                                <m:t>𝑥</m:t>
+                              </m:r>
+                            </m:e>
+                            <m:sub>
+                              <m:r>
+                                <a:rPr lang="en-US" i="1">
+                                  <a:latin typeface="Cambria Math" panose="02040503050406030204" pitchFamily="18" charset="0"/>
+                                </a:rPr>
+                                <m:t>𝑖</m:t>
+                              </m:r>
+                            </m:sub>
+                          </m:sSub>
+                          <m:sSup>
+                            <m:sSupPr>
+                              <m:ctrlPr>
+                                <a:rPr lang="en-US" i="1">
+                                  <a:latin typeface="Cambria Math" panose="02040503050406030204" pitchFamily="18" charset="0"/>
+                                </a:rPr>
+                              </m:ctrlPr>
+                            </m:sSupPr>
+                            <m:e>
+                              <m:r>
+                                <a:rPr lang="en-US" i="1">
+                                  <a:latin typeface="Cambria Math" panose="02040503050406030204" pitchFamily="18" charset="0"/>
+                                </a:rPr>
+                                <m:t>𝑒</m:t>
+                              </m:r>
+                            </m:e>
+                            <m:sup>
+                              <m:r>
+                                <a:rPr lang="en-US" i="1">
+                                  <a:latin typeface="Cambria Math" panose="02040503050406030204" pitchFamily="18" charset="0"/>
+                                </a:rPr>
+                                <m:t>−</m:t>
+                              </m:r>
+                              <m:r>
+                                <a:rPr lang="en-US" i="1">
+                                  <a:latin typeface="Cambria Math" panose="02040503050406030204" pitchFamily="18" charset="0"/>
+                                </a:rPr>
+                                <m:t>𝑏</m:t>
+                              </m:r>
+                              <m:sSub>
+                                <m:sSubPr>
+                                  <m:ctrlPr>
+                                    <a:rPr lang="en-US" i="1">
+                                      <a:latin typeface="Cambria Math" panose="02040503050406030204" pitchFamily="18" charset="0"/>
+                                    </a:rPr>
+                                  </m:ctrlPr>
+                                </m:sSubPr>
+                                <m:e>
+                                  <m:r>
+                                    <a:rPr lang="en-US" i="1">
+                                      <a:latin typeface="Cambria Math" panose="02040503050406030204" pitchFamily="18" charset="0"/>
+                                    </a:rPr>
+                                    <m:t>𝑥</m:t>
+                                  </m:r>
+                                </m:e>
+                                <m:sub>
+                                  <m:r>
+                                    <a:rPr lang="en-US" i="1">
+                                      <a:latin typeface="Cambria Math" panose="02040503050406030204" pitchFamily="18" charset="0"/>
+                                    </a:rPr>
+                                    <m:t>𝑖</m:t>
+                                  </m:r>
+                                </m:sub>
+                              </m:sSub>
+                            </m:sup>
+                          </m:sSup>
+                          <m:r>
+                            <a:rPr lang="en-US" i="1">
+                              <a:latin typeface="Cambria Math" panose="02040503050406030204" pitchFamily="18" charset="0"/>
+                            </a:rPr>
+                            <m:t>)</m:t>
+                          </m:r>
+                        </m:e>
+                      </m:nary>
+                    </m:oMath>
+                  </m:oMathPara>
+                </a14:m>
+                <a:endParaRPr lang="en-US" dirty="0"/>
+              </a:p>
             </p:txBody>
           </p:sp>
         </mc:Choice>
-        <mc:Fallback xmlns="">
+        <mc:Fallback>
           <p:sp>
             <p:nvSpPr>
               <p:cNvPr id="3" name="Content Placeholder 2">
@@ -7904,7 +8505,7 @@
               <a:blipFill>
                 <a:blip r:embed="rId2"/>
                 <a:stretch>
-                  <a:fillRect l="-2703" t="-1549"/>
+                  <a:fillRect l="-2336" t="-19298" b="-22807"/>
                 </a:stretch>
               </a:blipFill>
             </p:spPr>
@@ -9025,7 +9626,7 @@
                 </a14:m>
                 <a:r>
                   <a:rPr lang="en-US" dirty="0"/>
-                  <a:t>, gradients can be used-for first order approximation</a:t>
+                  <a:t>, gradients can be used for first order approximation</a:t>
                 </a:r>
               </a:p>
               <a:p>
@@ -9861,7 +10462,7 @@
               <p:cNvPr id="3" name="Content Placeholder 2">
                 <a:extLst>
                   <a:ext uri="{FF2B5EF4-FFF2-40B4-BE49-F238E27FC236}">
-                    <a16:creationId xmlns:a16="http://schemas.microsoft.com/office/drawing/2014/main" id="{5DC4D144-47D4-4031-A82D-E61D4D22DD86}"/>
+                    <a16:creationId xmlns:a16="http://schemas.microsoft.com/office/drawing/2014/main" xmlns:a14="http://schemas.microsoft.com/office/drawing/2010/main" xmlns="" id="{5DC4D144-47D4-4031-A82D-E61D4D22DD86}"/>
                   </a:ext>
                 </a:extLst>
               </p:cNvPr>
@@ -9877,7 +10478,7 @@
                 <a:off x="1097280" y="1539277"/>
                 <a:ext cx="10222361" cy="4329817"/>
               </a:xfrm>
-              <a:blipFill>
+              <a:blipFill rotWithShape="0">
                 <a:blip r:embed="rId2"/>
                 <a:stretch>
                   <a:fillRect l="-1431" t="-1268"/>
@@ -13412,7 +14013,7 @@
           <a:p>
             <a:r>
               <a:rPr lang="en-US" dirty="0"/>
-              <a:t>Compute the gradient of  loss function for scalar, vector and matrix parameters</a:t>
+              <a:t>Compute the gradient of a loss function for scalar, vector and matrix parameters</a:t>
             </a:r>
           </a:p>
           <a:p>
@@ -13841,7 +14442,7 @@
               <p:cNvPr id="3" name="Content Placeholder 2">
                 <a:extLst>
                   <a:ext uri="{FF2B5EF4-FFF2-40B4-BE49-F238E27FC236}">
-                    <a16:creationId xmlns:a16="http://schemas.microsoft.com/office/drawing/2014/main" id="{759229AE-0FF3-4E86-8FBD-80C598DB8E59}"/>
+                    <a16:creationId xmlns:a16="http://schemas.microsoft.com/office/drawing/2014/main" xmlns:a14="http://schemas.microsoft.com/office/drawing/2010/main" xmlns="" id="{759229AE-0FF3-4E86-8FBD-80C598DB8E59}"/>
                   </a:ext>
                 </a:extLst>
               </p:cNvPr>
@@ -13853,7 +14454,7 @@
               </p:nvPr>
             </p:nvSpPr>
             <p:spPr>
-              <a:blipFill>
+              <a:blipFill rotWithShape="0">
                 <a:blip r:embed="rId2"/>
                 <a:stretch>
                   <a:fillRect l="-1455" t="-1408"/>
@@ -14694,8 +15295,8 @@
           </a:p>
         </p:txBody>
       </p:sp>
-      <mc:AlternateContent xmlns:mc="http://schemas.openxmlformats.org/markup-compatibility/2006" xmlns:a14="http://schemas.microsoft.com/office/drawing/2010/main">
-        <mc:Choice Requires="a14">
+      <mc:AlternateContent xmlns:mc="http://schemas.openxmlformats.org/markup-compatibility/2006">
+        <mc:Choice xmlns:a14="http://schemas.microsoft.com/office/drawing/2010/main" Requires="a14">
           <p:sp>
             <p:nvSpPr>
               <p:cNvPr id="4" name="Content Placeholder 3"/>
@@ -14844,7 +15445,7 @@
                 </a14:m>
                 <a:r>
                   <a:rPr lang="en-US" dirty="0"/>
-                  <a:t> </a:t>
+                  <a:t> that converges to the true solution</a:t>
                 </a:r>
                 <a:br>
                   <a:rPr lang="en-US" dirty="0"/>
@@ -14934,7 +15535,7 @@
             </p:txBody>
           </p:sp>
         </mc:Choice>
-        <mc:Fallback xmlns="">
+        <mc:Fallback>
           <p:sp>
             <p:nvSpPr>
               <p:cNvPr id="4" name="Content Placeholder 3"/>
@@ -14949,7 +15550,7 @@
               <a:blipFill>
                 <a:blip r:embed="rId2"/>
                 <a:stretch>
-                  <a:fillRect l="-1455" t="-1549"/>
+                  <a:fillRect l="-1261" t="-1462"/>
                 </a:stretch>
               </a:blipFill>
             </p:spPr>
@@ -16221,8 +16822,8 @@
           </a:p>
         </p:txBody>
       </p:sp>
-      <mc:AlternateContent xmlns:mc="http://schemas.openxmlformats.org/markup-compatibility/2006" xmlns:a14="http://schemas.microsoft.com/office/drawing/2010/main">
-        <mc:Choice Requires="a14">
+      <mc:AlternateContent xmlns:mc="http://schemas.openxmlformats.org/markup-compatibility/2006">
+        <mc:Choice xmlns:a14="http://schemas.microsoft.com/office/drawing/2010/main" Requires="a14">
           <p:sp>
             <p:nvSpPr>
               <p:cNvPr id="4" name="Content Placeholder 3"/>
@@ -17195,13 +17796,25 @@
                 </a14:m>
                 <a:r>
                   <a:rPr lang="en-US" dirty="0"/>
-                  <a:t> is chosen sufficiently small, then gradient descent converges to local minima</a:t>
+                  <a:t> is chosen sufficiently small, then gradient descent converges to </a:t>
+                </a:r>
+                <a:r>
+                  <a:rPr lang="en-US" dirty="0">
+                    <a:solidFill>
+                      <a:srgbClr val="FF0000"/>
+                    </a:solidFill>
+                  </a:rPr>
+                  <a:t>local</a:t>
+                </a:r>
+                <a:r>
+                  <a:rPr lang="en-US" dirty="0"/>
+                  <a:t> minima</a:t>
                 </a:r>
               </a:p>
             </p:txBody>
           </p:sp>
         </mc:Choice>
-        <mc:Fallback xmlns="">
+        <mc:Fallback>
           <p:sp>
             <p:nvSpPr>
               <p:cNvPr id="4" name="Content Placeholder 3"/>
@@ -17216,7 +17829,7 @@
               <a:blipFill>
                 <a:blip r:embed="rId2"/>
                 <a:stretch>
-                  <a:fillRect l="-1455" t="-1549"/>
+                  <a:fillRect l="-1261" t="-1462"/>
                 </a:stretch>
               </a:blipFill>
             </p:spPr>
@@ -17840,18 +18453,20 @@
         </p:nvSpPr>
         <p:spPr/>
         <p:txBody>
-          <a:bodyPr/>
+          <a:bodyPr>
+            <a:normAutofit fontScale="90000"/>
+          </a:bodyPr>
           <a:lstStyle/>
           <a:p>
             <a:r>
               <a:rPr lang="en-US" dirty="0"/>
-              <a:t>Logistic Loss Function</a:t>
+              <a:t>Logistic Loss Function for Binary Classification (Review)</a:t>
             </a:r>
           </a:p>
         </p:txBody>
       </p:sp>
-      <mc:AlternateContent xmlns:mc="http://schemas.openxmlformats.org/markup-compatibility/2006">
-        <mc:Choice xmlns:a14="http://schemas.microsoft.com/office/drawing/2010/main" Requires="a14">
+      <mc:AlternateContent xmlns:mc="http://schemas.openxmlformats.org/markup-compatibility/2006" xmlns:a14="http://schemas.microsoft.com/office/drawing/2010/main">
+        <mc:Choice Requires="a14">
           <p:sp>
             <p:nvSpPr>
               <p:cNvPr id="3" name="Content Placeholder 2">
@@ -19558,7 +20173,7 @@
             </p:txBody>
           </p:sp>
         </mc:Choice>
-        <mc:Fallback>
+        <mc:Fallback xmlns="">
           <p:sp>
             <p:nvSpPr>
               <p:cNvPr id="3" name="Content Placeholder 2">
@@ -19786,10 +20401,10 @@
                       </m:sub>
                       <m:sup>
                         <m:r>
-                          <a:rPr lang="en-US" i="1">
-                            <a:latin typeface="Cambria Math" panose="02040503050406030204" pitchFamily="18" charset="0"/>
-                          </a:rPr>
-                          <m:t>𝑁</m:t>
+                          <a:rPr lang="en-US" b="0" i="1" smtClean="0">
+                            <a:latin typeface="Cambria Math" charset="0"/>
+                          </a:rPr>
+                          <m:t>𝑛</m:t>
                         </m:r>
                       </m:sup>
                       <m:e>
@@ -20917,7 +21532,7 @@
               <p:cNvPr id="3" name="Content Placeholder 2">
                 <a:extLst>
                   <a:ext uri="{FF2B5EF4-FFF2-40B4-BE49-F238E27FC236}">
-                    <a16:creationId xmlns:a16="http://schemas.microsoft.com/office/drawing/2014/main" id="{4CAC64C7-D216-4D4F-B198-DE8CF30BD107}"/>
+                    <a16:creationId xmlns:a16="http://schemas.microsoft.com/office/drawing/2014/main" xmlns:a14="http://schemas.microsoft.com/office/drawing/2010/main" xmlns="" id="{4CAC64C7-D216-4D4F-B198-DE8CF30BD107}"/>
                   </a:ext>
                 </a:extLst>
               </p:cNvPr>
@@ -20929,7 +21544,7 @@
               </p:nvPr>
             </p:nvSpPr>
             <p:spPr>
-              <a:blipFill>
+              <a:blipFill rotWithShape="0">
                 <a:blip r:embed="rId2"/>
                 <a:stretch>
                   <a:fillRect l="-1455" t="-1549"/>
@@ -21210,8 +21825,8 @@
           </a:p>
         </p:txBody>
       </p:sp>
-      <mc:AlternateContent xmlns:mc="http://schemas.openxmlformats.org/markup-compatibility/2006" xmlns:a14="http://schemas.microsoft.com/office/drawing/2010/main">
-        <mc:Choice Requires="a14">
+      <mc:AlternateContent xmlns:mc="http://schemas.openxmlformats.org/markup-compatibility/2006">
+        <mc:Choice xmlns:a14="http://schemas.microsoft.com/office/drawing/2010/main" Requires="a14">
           <p:sp>
             <p:nvSpPr>
               <p:cNvPr id="3" name="Content Placeholder 2">
@@ -21485,7 +22100,7 @@
                 </a:r>
                 <a:r>
                   <a:rPr lang="en-US" dirty="0"/>
-                  <a:t>:  Gradient can be computed by:</a:t>
+                  <a:t>:  Gradient can be computed by chain rule (show on the board):</a:t>
                 </a:r>
                 <a:br>
                   <a:rPr lang="en-US" dirty="0"/>
@@ -22031,24 +22646,439 @@
                       </a:rPr>
                       <m:t>𝑔</m:t>
                     </m:r>
+                    <m:d>
+                      <m:dPr>
+                        <m:ctrlPr>
+                          <a:rPr lang="en-US" b="1" i="1" smtClean="0">
+                            <a:latin typeface="Cambria Math" panose="02040503050406030204" pitchFamily="18" charset="0"/>
+                          </a:rPr>
+                        </m:ctrlPr>
+                      </m:dPr>
+                      <m:e>
+                        <m:r>
+                          <a:rPr lang="en-US" b="1" i="1" smtClean="0">
+                            <a:latin typeface="Cambria Math" panose="02040503050406030204" pitchFamily="18" charset="0"/>
+                          </a:rPr>
+                          <m:t>𝒛</m:t>
+                        </m:r>
+                      </m:e>
+                    </m:d>
                     <m:r>
                       <a:rPr lang="en-US" b="1" i="1" smtClean="0">
                         <a:latin typeface="Cambria Math" panose="02040503050406030204" pitchFamily="18" charset="0"/>
                       </a:rPr>
-                      <m:t>(</m:t>
-                    </m:r>
-                    <m:r>
-                      <a:rPr lang="en-US" b="1" i="1" smtClean="0">
-                        <a:latin typeface="Cambria Math" panose="02040503050406030204" pitchFamily="18" charset="0"/>
-                      </a:rPr>
-                      <m:t>𝒛</m:t>
-                    </m:r>
-                    <m:r>
-                      <a:rPr lang="en-US" b="1" i="1" smtClean="0">
-                        <a:latin typeface="Cambria Math" panose="02040503050406030204" pitchFamily="18" charset="0"/>
-                      </a:rPr>
-                      <m:t>)</m:t>
-                    </m:r>
+                      <m:t>, </m:t>
+                    </m:r>
+                  </m:oMath>
+                </a14:m>
+                <a:r>
+                  <a:rPr lang="en-US" dirty="0"/>
+                  <a:t>with </a:t>
+                </a:r>
+                <a14:m>
+                  <m:oMath xmlns:m="http://schemas.openxmlformats.org/officeDocument/2006/math">
+                    <m:sSub>
+                      <m:sSubPr>
+                        <m:ctrlPr>
+                          <a:rPr lang="en-US" i="1">
+                            <a:latin typeface="Cambria Math" panose="02040503050406030204" pitchFamily="18" charset="0"/>
+                          </a:rPr>
+                        </m:ctrlPr>
+                      </m:sSubPr>
+                      <m:e>
+                        <m:r>
+                          <a:rPr lang="en-US" i="1">
+                            <a:latin typeface="Cambria Math" panose="02040503050406030204" pitchFamily="18" charset="0"/>
+                          </a:rPr>
+                          <m:t>𝑔</m:t>
+                        </m:r>
+                      </m:e>
+                      <m:sub>
+                        <m:r>
+                          <a:rPr lang="en-US" i="1">
+                            <a:latin typeface="Cambria Math" panose="02040503050406030204" pitchFamily="18" charset="0"/>
+                          </a:rPr>
+                          <m:t>𝑖</m:t>
+                        </m:r>
+                      </m:sub>
+                    </m:sSub>
+                    <m:d>
+                      <m:dPr>
+                        <m:ctrlPr>
+                          <a:rPr lang="en-US" i="1">
+                            <a:latin typeface="Cambria Math" panose="02040503050406030204" pitchFamily="18" charset="0"/>
+                          </a:rPr>
+                        </m:ctrlPr>
+                      </m:dPr>
+                      <m:e>
+                        <m:sSub>
+                          <m:sSubPr>
+                            <m:ctrlPr>
+                              <a:rPr lang="en-US" i="1">
+                                <a:latin typeface="Cambria Math" panose="02040503050406030204" pitchFamily="18" charset="0"/>
+                              </a:rPr>
+                            </m:ctrlPr>
+                          </m:sSubPr>
+                          <m:e>
+                            <m:r>
+                              <a:rPr lang="en-US" i="1">
+                                <a:latin typeface="Cambria Math" panose="02040503050406030204" pitchFamily="18" charset="0"/>
+                              </a:rPr>
+                              <m:t>𝑧</m:t>
+                            </m:r>
+                          </m:e>
+                          <m:sub>
+                            <m:r>
+                              <a:rPr lang="en-US" i="1">
+                                <a:latin typeface="Cambria Math" panose="02040503050406030204" pitchFamily="18" charset="0"/>
+                              </a:rPr>
+                              <m:t>𝑖</m:t>
+                            </m:r>
+                          </m:sub>
+                        </m:sSub>
+                      </m:e>
+                    </m:d>
+                    <m:r>
+                      <a:rPr lang="en-US" b="0" i="0" smtClean="0">
+                        <a:latin typeface="Cambria Math" panose="02040503050406030204" pitchFamily="18" charset="0"/>
+                      </a:rPr>
+                      <m:t>=</m:t>
+                    </m:r>
+                    <m:sSub>
+                      <m:sSubPr>
+                        <m:ctrlPr>
+                          <a:rPr lang="en-US" i="1">
+                            <a:latin typeface="Cambria Math" panose="02040503050406030204" pitchFamily="18" charset="0"/>
+                          </a:rPr>
+                        </m:ctrlPr>
+                      </m:sSubPr>
+                      <m:e>
+                        <m:r>
+                          <a:rPr lang="en-US" i="1">
+                            <a:latin typeface="Cambria Math" panose="02040503050406030204" pitchFamily="18" charset="0"/>
+                          </a:rPr>
+                          <m:t>−</m:t>
+                        </m:r>
+                        <m:r>
+                          <a:rPr lang="en-US" i="1">
+                            <a:latin typeface="Cambria Math" panose="02040503050406030204" pitchFamily="18" charset="0"/>
+                          </a:rPr>
+                          <m:t>𝑦</m:t>
+                        </m:r>
+                      </m:e>
+                      <m:sub>
+                        <m:r>
+                          <a:rPr lang="en-US" i="1">
+                            <a:latin typeface="Cambria Math" panose="02040503050406030204" pitchFamily="18" charset="0"/>
+                          </a:rPr>
+                          <m:t>𝑖</m:t>
+                        </m:r>
+                      </m:sub>
+                    </m:sSub>
+                    <m:sSub>
+                      <m:sSubPr>
+                        <m:ctrlPr>
+                          <a:rPr lang="en-US" i="1">
+                            <a:latin typeface="Cambria Math" panose="02040503050406030204" pitchFamily="18" charset="0"/>
+                          </a:rPr>
+                        </m:ctrlPr>
+                      </m:sSubPr>
+                      <m:e>
+                        <m:r>
+                          <a:rPr lang="en-US" i="1">
+                            <a:latin typeface="Cambria Math" panose="02040503050406030204" pitchFamily="18" charset="0"/>
+                          </a:rPr>
+                          <m:t>𝑧</m:t>
+                        </m:r>
+                      </m:e>
+                      <m:sub>
+                        <m:r>
+                          <a:rPr lang="en-US" i="1">
+                            <a:latin typeface="Cambria Math" panose="02040503050406030204" pitchFamily="18" charset="0"/>
+                          </a:rPr>
+                          <m:t>𝑖</m:t>
+                        </m:r>
+                      </m:sub>
+                    </m:sSub>
+                    <m:r>
+                      <a:rPr lang="en-US" i="1">
+                        <a:latin typeface="Cambria Math" panose="02040503050406030204" pitchFamily="18" charset="0"/>
+                      </a:rPr>
+                      <m:t>+</m:t>
+                    </m:r>
+                    <m:func>
+                      <m:funcPr>
+                        <m:ctrlPr>
+                          <a:rPr lang="en-US" i="1">
+                            <a:latin typeface="Cambria Math" panose="02040503050406030204" pitchFamily="18" charset="0"/>
+                          </a:rPr>
+                        </m:ctrlPr>
+                      </m:funcPr>
+                      <m:fName>
+                        <m:r>
+                          <m:rPr>
+                            <m:sty m:val="p"/>
+                          </m:rPr>
+                          <a:rPr lang="en-US">
+                            <a:latin typeface="Cambria Math" panose="02040503050406030204" pitchFamily="18" charset="0"/>
+                          </a:rPr>
+                          <m:t>ln</m:t>
+                        </m:r>
+                      </m:fName>
+                      <m:e>
+                        <m:d>
+                          <m:dPr>
+                            <m:begChr m:val="["/>
+                            <m:endChr m:val="]"/>
+                            <m:ctrlPr>
+                              <a:rPr lang="en-US" i="1">
+                                <a:latin typeface="Cambria Math" panose="02040503050406030204" pitchFamily="18" charset="0"/>
+                              </a:rPr>
+                            </m:ctrlPr>
+                          </m:dPr>
+                          <m:e>
+                            <m:r>
+                              <a:rPr lang="en-US" i="1">
+                                <a:latin typeface="Cambria Math" panose="02040503050406030204" pitchFamily="18" charset="0"/>
+                              </a:rPr>
+                              <m:t>1+</m:t>
+                            </m:r>
+                            <m:sSup>
+                              <m:sSupPr>
+                                <m:ctrlPr>
+                                  <a:rPr lang="en-US" i="1">
+                                    <a:latin typeface="Cambria Math" panose="02040503050406030204" pitchFamily="18" charset="0"/>
+                                  </a:rPr>
+                                </m:ctrlPr>
+                              </m:sSupPr>
+                              <m:e>
+                                <m:r>
+                                  <a:rPr lang="en-US" i="1">
+                                    <a:latin typeface="Cambria Math" panose="02040503050406030204" pitchFamily="18" charset="0"/>
+                                  </a:rPr>
+                                  <m:t>𝑒</m:t>
+                                </m:r>
+                              </m:e>
+                              <m:sup>
+                                <m:sSub>
+                                  <m:sSubPr>
+                                    <m:ctrlPr>
+                                      <a:rPr lang="en-US" i="1">
+                                        <a:latin typeface="Cambria Math" panose="02040503050406030204" pitchFamily="18" charset="0"/>
+                                      </a:rPr>
+                                    </m:ctrlPr>
+                                  </m:sSubPr>
+                                  <m:e>
+                                    <m:r>
+                                      <a:rPr lang="en-US" i="1">
+                                        <a:latin typeface="Cambria Math" panose="02040503050406030204" pitchFamily="18" charset="0"/>
+                                      </a:rPr>
+                                      <m:t>𝑧</m:t>
+                                    </m:r>
+                                  </m:e>
+                                  <m:sub>
+                                    <m:r>
+                                      <a:rPr lang="en-US" i="1">
+                                        <a:latin typeface="Cambria Math" panose="02040503050406030204" pitchFamily="18" charset="0"/>
+                                      </a:rPr>
+                                      <m:t>𝑖</m:t>
+                                    </m:r>
+                                  </m:sub>
+                                </m:sSub>
+                              </m:sup>
+                            </m:sSup>
+                          </m:e>
+                        </m:d>
+                      </m:e>
+                    </m:func>
+                    <m:r>
+                      <a:rPr lang="en-US" b="0" i="0" smtClean="0">
+                        <a:latin typeface="Cambria Math" panose="02040503050406030204" pitchFamily="18" charset="0"/>
+                      </a:rPr>
+                      <m:t>=</m:t>
+                    </m:r>
+                    <m:d>
+                      <m:dPr>
+                        <m:ctrlPr>
+                          <a:rPr lang="en-US" b="0" i="1" smtClean="0">
+                            <a:latin typeface="Cambria Math" panose="02040503050406030204" pitchFamily="18" charset="0"/>
+                          </a:rPr>
+                        </m:ctrlPr>
+                      </m:dPr>
+                      <m:e>
+                        <m:r>
+                          <a:rPr lang="en-US" b="0" i="1" smtClean="0">
+                            <a:latin typeface="Cambria Math" panose="02040503050406030204" pitchFamily="18" charset="0"/>
+                          </a:rPr>
+                          <m:t>1</m:t>
+                        </m:r>
+                        <m:sSub>
+                          <m:sSubPr>
+                            <m:ctrlPr>
+                              <a:rPr lang="en-US" i="1">
+                                <a:latin typeface="Cambria Math" panose="02040503050406030204" pitchFamily="18" charset="0"/>
+                              </a:rPr>
+                            </m:ctrlPr>
+                          </m:sSubPr>
+                          <m:e>
+                            <m:r>
+                              <a:rPr lang="en-US" i="1">
+                                <a:latin typeface="Cambria Math" panose="02040503050406030204" pitchFamily="18" charset="0"/>
+                              </a:rPr>
+                              <m:t>−</m:t>
+                            </m:r>
+                            <m:r>
+                              <a:rPr lang="en-US" i="1">
+                                <a:latin typeface="Cambria Math" panose="02040503050406030204" pitchFamily="18" charset="0"/>
+                              </a:rPr>
+                              <m:t>𝑦</m:t>
+                            </m:r>
+                          </m:e>
+                          <m:sub>
+                            <m:r>
+                              <a:rPr lang="en-US" i="1">
+                                <a:latin typeface="Cambria Math" panose="02040503050406030204" pitchFamily="18" charset="0"/>
+                              </a:rPr>
+                              <m:t>𝑖</m:t>
+                            </m:r>
+                          </m:sub>
+                        </m:sSub>
+                      </m:e>
+                    </m:d>
+                  </m:oMath>
+                </a14:m>
+                <a:r>
+                  <a:rPr lang="en-US" dirty="0"/>
+                  <a:t> </a:t>
+                </a:r>
+                <a14:m>
+                  <m:oMath xmlns:m="http://schemas.openxmlformats.org/officeDocument/2006/math">
+                    <m:sSub>
+                      <m:sSubPr>
+                        <m:ctrlPr>
+                          <a:rPr lang="en-US" i="1">
+                            <a:latin typeface="Cambria Math" panose="02040503050406030204" pitchFamily="18" charset="0"/>
+                          </a:rPr>
+                        </m:ctrlPr>
+                      </m:sSubPr>
+                      <m:e>
+                        <m:r>
+                          <a:rPr lang="en-US" i="1">
+                            <a:latin typeface="Cambria Math" panose="02040503050406030204" pitchFamily="18" charset="0"/>
+                          </a:rPr>
+                          <m:t>𝑧</m:t>
+                        </m:r>
+                      </m:e>
+                      <m:sub>
+                        <m:r>
+                          <a:rPr lang="en-US" i="1">
+                            <a:latin typeface="Cambria Math" panose="02040503050406030204" pitchFamily="18" charset="0"/>
+                          </a:rPr>
+                          <m:t>𝑖</m:t>
+                        </m:r>
+                      </m:sub>
+                    </m:sSub>
+                    <m:r>
+                      <a:rPr lang="en-US" b="0" i="0" smtClean="0">
+                        <a:latin typeface="Cambria Math" panose="02040503050406030204" pitchFamily="18" charset="0"/>
+                      </a:rPr>
+                      <m:t>−</m:t>
+                    </m:r>
+                    <m:r>
+                      <m:rPr>
+                        <m:sty m:val="p"/>
+                      </m:rPr>
+                      <a:rPr lang="en-US" b="0" i="0" smtClean="0">
+                        <a:latin typeface="Cambria Math" panose="02040503050406030204" pitchFamily="18" charset="0"/>
+                      </a:rPr>
+                      <m:t>ln</m:t>
+                    </m:r>
+                  </m:oMath>
+                </a14:m>
+                <a:r>
+                  <a:rPr lang="en-US" dirty="0"/>
+                  <a:t> </a:t>
+                </a:r>
+                <a14:m>
+                  <m:oMath xmlns:m="http://schemas.openxmlformats.org/officeDocument/2006/math">
+                    <m:f>
+                      <m:fPr>
+                        <m:ctrlPr>
+                          <a:rPr lang="en-US" i="1">
+                            <a:latin typeface="Cambria Math" panose="02040503050406030204" pitchFamily="18" charset="0"/>
+                          </a:rPr>
+                        </m:ctrlPr>
+                      </m:fPr>
+                      <m:num>
+                        <m:r>
+                          <a:rPr lang="en-US" i="1">
+                            <a:latin typeface="Cambria Math" panose="02040503050406030204" pitchFamily="18" charset="0"/>
+                          </a:rPr>
+                          <m:t>1</m:t>
+                        </m:r>
+                      </m:num>
+                      <m:den>
+                        <m:r>
+                          <a:rPr lang="en-US" i="1">
+                            <a:latin typeface="Cambria Math" panose="02040503050406030204" pitchFamily="18" charset="0"/>
+                          </a:rPr>
+                          <m:t>1+</m:t>
+                        </m:r>
+                        <m:sSup>
+                          <m:sSupPr>
+                            <m:ctrlPr>
+                              <a:rPr lang="en-US" i="1">
+                                <a:latin typeface="Cambria Math" panose="02040503050406030204" pitchFamily="18" charset="0"/>
+                              </a:rPr>
+                            </m:ctrlPr>
+                          </m:sSupPr>
+                          <m:e>
+                            <m:r>
+                              <a:rPr lang="en-US" i="1">
+                                <a:latin typeface="Cambria Math" panose="02040503050406030204" pitchFamily="18" charset="0"/>
+                              </a:rPr>
+                              <m:t>𝑒</m:t>
+                            </m:r>
+                          </m:e>
+                          <m:sup>
+                            <m:sSub>
+                              <m:sSubPr>
+                                <m:ctrlPr>
+                                  <a:rPr lang="en-US" i="1">
+                                    <a:latin typeface="Cambria Math" panose="02040503050406030204" pitchFamily="18" charset="0"/>
+                                  </a:rPr>
+                                </m:ctrlPr>
+                              </m:sSubPr>
+                              <m:e>
+                                <m:r>
+                                  <a:rPr lang="en-US" i="1">
+                                    <a:latin typeface="Cambria Math" panose="02040503050406030204" pitchFamily="18" charset="0"/>
+                                  </a:rPr>
+                                  <m:t>−</m:t>
+                                </m:r>
+                                <m:r>
+                                  <m:rPr>
+                                    <m:brk m:alnAt="7"/>
+                                  </m:rPr>
+                                  <a:rPr lang="en-US" i="1">
+                                    <a:latin typeface="Cambria Math" panose="02040503050406030204" pitchFamily="18" charset="0"/>
+                                  </a:rPr>
+                                  <m:t>𝑧</m:t>
+                                </m:r>
+                              </m:e>
+                              <m:sub>
+                                <m:r>
+                                  <a:rPr lang="en-US" i="1">
+                                    <a:latin typeface="Cambria Math" panose="02040503050406030204" pitchFamily="18" charset="0"/>
+                                  </a:rPr>
+                                  <m:t>𝑖</m:t>
+                                </m:r>
+                              </m:sub>
+                            </m:sSub>
+                          </m:sup>
+                        </m:sSup>
+                      </m:den>
+                    </m:f>
                   </m:oMath>
                 </a14:m>
                 <a:endParaRPr lang="en-US" dirty="0"/>
@@ -22109,6 +23139,224 @@
                         </m:r>
                       </m:e>
                     </m:d>
+                  </m:oMath>
+                </a14:m>
+                <a:r>
+                  <a:rPr lang="en-US" dirty="0"/>
+                  <a:t>, with </a:t>
+                </a:r>
+                <a14:m>
+                  <m:oMath xmlns:m="http://schemas.openxmlformats.org/officeDocument/2006/math">
+                    <m:sSubSup>
+                      <m:sSubSupPr>
+                        <m:ctrlPr>
+                          <a:rPr lang="en-US" i="1">
+                            <a:latin typeface="Cambria Math" panose="02040503050406030204" pitchFamily="18" charset="0"/>
+                          </a:rPr>
+                        </m:ctrlPr>
+                      </m:sSubSupPr>
+                      <m:e>
+                        <m:r>
+                          <a:rPr lang="en-US" b="0" i="1" smtClean="0">
+                            <a:latin typeface="Cambria Math" panose="02040503050406030204" pitchFamily="18" charset="0"/>
+                          </a:rPr>
+                          <m:t> </m:t>
+                        </m:r>
+                        <m:r>
+                          <m:rPr>
+                            <m:brk m:alnAt="7"/>
+                          </m:rPr>
+                          <a:rPr lang="en-US" i="1">
+                            <a:latin typeface="Cambria Math" panose="02040503050406030204" pitchFamily="18" charset="0"/>
+                          </a:rPr>
+                          <m:t>𝑔</m:t>
+                        </m:r>
+                      </m:e>
+                      <m:sub>
+                        <m:r>
+                          <a:rPr lang="en-US" b="0" i="1" smtClean="0">
+                            <a:latin typeface="Cambria Math" panose="02040503050406030204" pitchFamily="18" charset="0"/>
+                          </a:rPr>
+                          <m:t>𝑖</m:t>
+                        </m:r>
+                      </m:sub>
+                      <m:sup>
+                        <m:r>
+                          <a:rPr lang="en-US" i="1">
+                            <a:latin typeface="Cambria Math" panose="02040503050406030204" pitchFamily="18" charset="0"/>
+                          </a:rPr>
+                          <m:t>′</m:t>
+                        </m:r>
+                      </m:sup>
+                    </m:sSubSup>
+                    <m:d>
+                      <m:dPr>
+                        <m:ctrlPr>
+                          <a:rPr lang="en-US" i="1">
+                            <a:latin typeface="Cambria Math" panose="02040503050406030204" pitchFamily="18" charset="0"/>
+                          </a:rPr>
+                        </m:ctrlPr>
+                      </m:dPr>
+                      <m:e>
+                        <m:sSub>
+                          <m:sSubPr>
+                            <m:ctrlPr>
+                              <a:rPr lang="en-US" i="1">
+                                <a:latin typeface="Cambria Math" panose="02040503050406030204" pitchFamily="18" charset="0"/>
+                              </a:rPr>
+                            </m:ctrlPr>
+                          </m:sSubPr>
+                          <m:e>
+                            <m:r>
+                              <m:rPr>
+                                <m:brk m:alnAt="7"/>
+                              </m:rPr>
+                              <a:rPr lang="en-US" i="1">
+                                <a:latin typeface="Cambria Math" panose="02040503050406030204" pitchFamily="18" charset="0"/>
+                              </a:rPr>
+                              <m:t>𝑧</m:t>
+                            </m:r>
+                          </m:e>
+                          <m:sub>
+                            <m:r>
+                              <a:rPr lang="en-US" b="0" i="1" smtClean="0">
+                                <a:latin typeface="Cambria Math" panose="02040503050406030204" pitchFamily="18" charset="0"/>
+                              </a:rPr>
+                              <m:t>𝑖</m:t>
+                            </m:r>
+                          </m:sub>
+                        </m:sSub>
+                      </m:e>
+                    </m:d>
+                    <m:r>
+                      <a:rPr lang="en-US" b="0" i="1" smtClean="0">
+                        <a:latin typeface="Cambria Math" panose="02040503050406030204" pitchFamily="18" charset="0"/>
+                      </a:rPr>
+                      <m:t>=−</m:t>
+                    </m:r>
+                    <m:sSub>
+                      <m:sSubPr>
+                        <m:ctrlPr>
+                          <a:rPr lang="en-US" i="1">
+                            <a:latin typeface="Cambria Math" panose="02040503050406030204" pitchFamily="18" charset="0"/>
+                          </a:rPr>
+                        </m:ctrlPr>
+                      </m:sSubPr>
+                      <m:e>
+                        <m:r>
+                          <a:rPr lang="en-US" b="0" i="1" smtClean="0">
+                            <a:latin typeface="Cambria Math" panose="02040503050406030204" pitchFamily="18" charset="0"/>
+                          </a:rPr>
+                          <m:t>𝑦</m:t>
+                        </m:r>
+                      </m:e>
+                      <m:sub>
+                        <m:r>
+                          <a:rPr lang="en-US" i="1">
+                            <a:latin typeface="Cambria Math" panose="02040503050406030204" pitchFamily="18" charset="0"/>
+                          </a:rPr>
+                          <m:t>𝑖</m:t>
+                        </m:r>
+                      </m:sub>
+                    </m:sSub>
+                    <m:r>
+                      <a:rPr lang="en-US" b="0" i="0" smtClean="0">
+                        <a:latin typeface="Cambria Math" panose="02040503050406030204" pitchFamily="18" charset="0"/>
+                      </a:rPr>
+                      <m:t>+</m:t>
+                    </m:r>
+                    <m:box>
+                      <m:boxPr>
+                        <m:ctrlPr>
+                          <a:rPr lang="en-US" b="0" i="1" smtClean="0">
+                            <a:latin typeface="Cambria Math" panose="02040503050406030204" pitchFamily="18" charset="0"/>
+                          </a:rPr>
+                        </m:ctrlPr>
+                      </m:boxPr>
+                      <m:e>
+                        <m:argPr>
+                          <m:argSz m:val="-1"/>
+                        </m:argPr>
+                        <m:f>
+                          <m:fPr>
+                            <m:ctrlPr>
+                              <a:rPr lang="en-US" b="0" i="1" smtClean="0">
+                                <a:latin typeface="Cambria Math" panose="02040503050406030204" pitchFamily="18" charset="0"/>
+                              </a:rPr>
+                            </m:ctrlPr>
+                          </m:fPr>
+                          <m:num>
+                            <m:r>
+                              <a:rPr lang="en-US" b="0" i="1" smtClean="0">
+                                <a:latin typeface="Cambria Math" panose="02040503050406030204" pitchFamily="18" charset="0"/>
+                              </a:rPr>
+                              <m:t>1</m:t>
+                            </m:r>
+                          </m:num>
+                          <m:den>
+                            <m:r>
+                              <a:rPr lang="en-US" b="0" i="1" smtClean="0">
+                                <a:latin typeface="Cambria Math" panose="02040503050406030204" pitchFamily="18" charset="0"/>
+                              </a:rPr>
+                              <m:t>1+</m:t>
+                            </m:r>
+                            <m:sSup>
+                              <m:sSupPr>
+                                <m:ctrlPr>
+                                  <a:rPr lang="en-US" i="1">
+                                    <a:latin typeface="Cambria Math" panose="02040503050406030204" pitchFamily="18" charset="0"/>
+                                  </a:rPr>
+                                </m:ctrlPr>
+                              </m:sSupPr>
+                              <m:e>
+                                <m:r>
+                                  <a:rPr lang="en-US" i="1">
+                                    <a:latin typeface="Cambria Math" panose="02040503050406030204" pitchFamily="18" charset="0"/>
+                                  </a:rPr>
+                                  <m:t>𝑒</m:t>
+                                </m:r>
+                              </m:e>
+                              <m:sup>
+                                <m:sSub>
+                                  <m:sSubPr>
+                                    <m:ctrlPr>
+                                      <a:rPr lang="en-US" i="1">
+                                        <a:latin typeface="Cambria Math" panose="02040503050406030204" pitchFamily="18" charset="0"/>
+                                      </a:rPr>
+                                    </m:ctrlPr>
+                                  </m:sSubPr>
+                                  <m:e>
+                                    <m:r>
+                                      <a:rPr lang="en-US" b="0" i="1" smtClean="0">
+                                        <a:latin typeface="Cambria Math" panose="02040503050406030204" pitchFamily="18" charset="0"/>
+                                      </a:rPr>
+                                      <m:t>−</m:t>
+                                    </m:r>
+                                    <m:r>
+                                      <m:rPr>
+                                        <m:brk m:alnAt="7"/>
+                                      </m:rPr>
+                                      <a:rPr lang="en-US" i="1">
+                                        <a:latin typeface="Cambria Math" panose="02040503050406030204" pitchFamily="18" charset="0"/>
+                                      </a:rPr>
+                                      <m:t>𝑧</m:t>
+                                    </m:r>
+                                  </m:e>
+                                  <m:sub>
+                                    <m:r>
+                                      <a:rPr lang="en-US" i="1">
+                                        <a:latin typeface="Cambria Math" panose="02040503050406030204" pitchFamily="18" charset="0"/>
+                                      </a:rPr>
+                                      <m:t>𝑖</m:t>
+                                    </m:r>
+                                  </m:sub>
+                                </m:sSub>
+                              </m:sup>
+                            </m:sSup>
+                          </m:den>
+                        </m:f>
+                      </m:e>
+                    </m:box>
                   </m:oMath>
                 </a14:m>
                 <a:endParaRPr lang="en-US" dirty="0"/>
@@ -22259,7 +23507,7 @@
             </p:txBody>
           </p:sp>
         </mc:Choice>
-        <mc:Fallback xmlns="">
+        <mc:Fallback>
           <p:sp>
             <p:nvSpPr>
               <p:cNvPr id="3" name="Content Placeholder 2">
@@ -22280,7 +23528,7 @@
               <a:blipFill>
                 <a:blip r:embed="rId2"/>
                 <a:stretch>
-                  <a:fillRect l="-1455" t="-1549"/>
+                  <a:fillRect l="-1261" t="-17251"/>
                 </a:stretch>
               </a:blipFill>
             </p:spPr>
@@ -26912,8 +28160,8 @@
           </a:p>
         </p:txBody>
       </p:sp>
-      <mc:AlternateContent xmlns:mc="http://schemas.openxmlformats.org/markup-compatibility/2006" xmlns:a14="http://schemas.microsoft.com/office/drawing/2010/main">
-        <mc:Choice Requires="a14">
+      <mc:AlternateContent xmlns:mc="http://schemas.openxmlformats.org/markup-compatibility/2006">
+        <mc:Choice xmlns:a14="http://schemas.microsoft.com/office/drawing/2010/main" Requires="a14">
           <p:sp>
             <p:nvSpPr>
               <p:cNvPr id="4" name="Content Placeholder 3"/>
@@ -27162,10 +28410,16 @@
                   <a:t>No overshoot</a:t>
                 </a:r>
               </a:p>
+              <a:p>
+                <a:pPr marL="0" indent="0">
+                  <a:buNone/>
+                </a:pPr>
+                <a:endParaRPr lang="en-US" sz="2400" dirty="0"/>
+              </a:p>
             </p:txBody>
           </p:sp>
         </mc:Choice>
-        <mc:Fallback xmlns="">
+        <mc:Fallback>
           <p:sp>
             <p:nvSpPr>
               <p:cNvPr id="4" name="Content Placeholder 3"/>
@@ -27184,7 +28438,7 @@
               <a:blipFill>
                 <a:blip r:embed="rId2"/>
                 <a:stretch>
-                  <a:fillRect l="-3046" t="-2050"/>
+                  <a:fillRect l="-3057" t="-1520"/>
                 </a:stretch>
               </a:blipFill>
             </p:spPr>
@@ -27446,6 +28700,310 @@
           </p:sp>
         </mc:Fallback>
       </mc:AlternateContent>
+      <mc:AlternateContent xmlns:mc="http://schemas.openxmlformats.org/markup-compatibility/2006">
+        <mc:Choice xmlns:a14="http://schemas.microsoft.com/office/drawing/2010/main" Requires="a14">
+          <p:sp>
+            <p:nvSpPr>
+              <p:cNvPr id="5" name="TextBox 4">
+                <a:extLst>
+                  <a:ext uri="{FF2B5EF4-FFF2-40B4-BE49-F238E27FC236}">
+                    <a16:creationId xmlns:a16="http://schemas.microsoft.com/office/drawing/2014/main" id="{4F349155-E879-A04C-A3E4-54E7AF84C491}"/>
+                  </a:ext>
+                </a:extLst>
+              </p:cNvPr>
+              <p:cNvSpPr txBox="1"/>
+              <p:nvPr/>
+            </p:nvSpPr>
+            <p:spPr>
+              <a:xfrm>
+                <a:off x="3699990" y="5121222"/>
+                <a:ext cx="6302816" cy="459678"/>
+              </a:xfrm>
+              <a:prstGeom prst="rect">
+                <a:avLst/>
+              </a:prstGeom>
+              <a:noFill/>
+            </p:spPr>
+            <p:txBody>
+              <a:bodyPr wrap="none" rtlCol="0">
+                <a:spAutoFit/>
+              </a:bodyPr>
+              <a:lstStyle/>
+              <a:p>
+                <a:r>
+                  <a:rPr lang="en-US" dirty="0"/>
+                  <a:t>Line representing </a:t>
+                </a:r>
+                <a14:m>
+                  <m:oMath xmlns:m="http://schemas.openxmlformats.org/officeDocument/2006/math">
+                    <m:r>
+                      <a:rPr lang="en-US" b="0" i="1" smtClean="0">
+                        <a:latin typeface="Cambria Math" panose="02040503050406030204" pitchFamily="18" charset="0"/>
+                        <a:ea typeface="Cambria Math" panose="02040503050406030204" pitchFamily="18" charset="0"/>
+                      </a:rPr>
+                      <m:t>𝑦</m:t>
+                    </m:r>
+                    <m:r>
+                      <a:rPr lang="en-US" b="0" i="1" smtClean="0">
+                        <a:latin typeface="Cambria Math" panose="02040503050406030204" pitchFamily="18" charset="0"/>
+                        <a:ea typeface="Cambria Math" panose="02040503050406030204" pitchFamily="18" charset="0"/>
+                      </a:rPr>
+                      <m:t>(</m:t>
+                    </m:r>
+                    <m:r>
+                      <a:rPr lang="en-US" b="0" i="1" smtClean="0">
+                        <a:latin typeface="Cambria Math" panose="02040503050406030204" pitchFamily="18" charset="0"/>
+                        <a:ea typeface="Cambria Math" panose="02040503050406030204" pitchFamily="18" charset="0"/>
+                      </a:rPr>
+                      <m:t>𝛼</m:t>
+                    </m:r>
+                    <m:r>
+                      <a:rPr lang="en-US" b="0" i="1" smtClean="0">
+                        <a:latin typeface="Cambria Math" panose="02040503050406030204" pitchFamily="18" charset="0"/>
+                        <a:ea typeface="Cambria Math" panose="02040503050406030204" pitchFamily="18" charset="0"/>
+                      </a:rPr>
+                      <m:t>)=</m:t>
+                    </m:r>
+                    <m:r>
+                      <a:rPr lang="en-US" i="1">
+                        <a:latin typeface="Cambria Math" panose="02040503050406030204" pitchFamily="18" charset="0"/>
+                      </a:rPr>
+                      <m:t>𝑓</m:t>
+                    </m:r>
+                    <m:d>
+                      <m:dPr>
+                        <m:ctrlPr>
+                          <a:rPr lang="en-US" i="1">
+                            <a:latin typeface="Cambria Math" panose="02040503050406030204" pitchFamily="18" charset="0"/>
+                          </a:rPr>
+                        </m:ctrlPr>
+                      </m:dPr>
+                      <m:e>
+                        <m:sSup>
+                          <m:sSupPr>
+                            <m:ctrlPr>
+                              <a:rPr lang="en-US" i="1">
+                                <a:latin typeface="Cambria Math" panose="02040503050406030204" pitchFamily="18" charset="0"/>
+                              </a:rPr>
+                            </m:ctrlPr>
+                          </m:sSupPr>
+                          <m:e>
+                            <m:r>
+                              <a:rPr lang="en-US" i="1">
+                                <a:latin typeface="Cambria Math" panose="02040503050406030204" pitchFamily="18" charset="0"/>
+                              </a:rPr>
+                              <m:t>𝑤</m:t>
+                            </m:r>
+                          </m:e>
+                          <m:sup>
+                            <m:r>
+                              <a:rPr lang="en-US" i="1">
+                                <a:latin typeface="Cambria Math" panose="02040503050406030204" pitchFamily="18" charset="0"/>
+                              </a:rPr>
+                              <m:t>𝑘</m:t>
+                            </m:r>
+                          </m:sup>
+                        </m:sSup>
+                      </m:e>
+                    </m:d>
+                    <m:r>
+                      <a:rPr lang="en-US" i="1">
+                        <a:latin typeface="Cambria Math" panose="02040503050406030204" pitchFamily="18" charset="0"/>
+                      </a:rPr>
+                      <m:t>−</m:t>
+                    </m:r>
+                    <m:r>
+                      <a:rPr lang="en-US" i="1">
+                        <a:latin typeface="Cambria Math" panose="02040503050406030204" pitchFamily="18" charset="0"/>
+                      </a:rPr>
+                      <m:t>𝑐</m:t>
+                    </m:r>
+                    <m:r>
+                      <a:rPr lang="en-US" i="1">
+                        <a:latin typeface="Cambria Math" panose="02040503050406030204" pitchFamily="18" charset="0"/>
+                      </a:rPr>
+                      <m:t>𝛼</m:t>
+                    </m:r>
+                    <m:r>
+                      <a:rPr lang="en-US" i="1">
+                        <a:latin typeface="Cambria Math" panose="02040503050406030204" pitchFamily="18" charset="0"/>
+                      </a:rPr>
+                      <m:t> </m:t>
+                    </m:r>
+                    <m:sSup>
+                      <m:sSupPr>
+                        <m:ctrlPr>
+                          <a:rPr lang="en-US" i="1">
+                            <a:latin typeface="Cambria Math" panose="02040503050406030204" pitchFamily="18" charset="0"/>
+                          </a:rPr>
+                        </m:ctrlPr>
+                      </m:sSupPr>
+                      <m:e>
+                        <m:d>
+                          <m:dPr>
+                            <m:begChr m:val="‖"/>
+                            <m:endChr m:val="‖"/>
+                            <m:ctrlPr>
+                              <a:rPr lang="en-US" i="1">
+                                <a:latin typeface="Cambria Math" panose="02040503050406030204" pitchFamily="18" charset="0"/>
+                              </a:rPr>
+                            </m:ctrlPr>
+                          </m:dPr>
+                          <m:e>
+                            <m:r>
+                              <a:rPr lang="en-US">
+                                <a:latin typeface="Cambria Math" panose="02040503050406030204" pitchFamily="18" charset="0"/>
+                              </a:rPr>
+                              <m:t>𝛻</m:t>
+                            </m:r>
+                            <m:r>
+                              <a:rPr lang="en-US" i="1">
+                                <a:latin typeface="Cambria Math" panose="02040503050406030204" pitchFamily="18" charset="0"/>
+                              </a:rPr>
+                              <m:t>𝑓</m:t>
+                            </m:r>
+                            <m:d>
+                              <m:dPr>
+                                <m:ctrlPr>
+                                  <a:rPr lang="en-US" i="1">
+                                    <a:latin typeface="Cambria Math" panose="02040503050406030204" pitchFamily="18" charset="0"/>
+                                  </a:rPr>
+                                </m:ctrlPr>
+                              </m:dPr>
+                              <m:e>
+                                <m:sSup>
+                                  <m:sSupPr>
+                                    <m:ctrlPr>
+                                      <a:rPr lang="en-US" i="1">
+                                        <a:latin typeface="Cambria Math" panose="02040503050406030204" pitchFamily="18" charset="0"/>
+                                      </a:rPr>
+                                    </m:ctrlPr>
+                                  </m:sSupPr>
+                                  <m:e>
+                                    <m:r>
+                                      <a:rPr lang="en-US" i="1">
+                                        <a:latin typeface="Cambria Math" panose="02040503050406030204" pitchFamily="18" charset="0"/>
+                                      </a:rPr>
+                                      <m:t>𝑤</m:t>
+                                    </m:r>
+                                  </m:e>
+                                  <m:sup>
+                                    <m:r>
+                                      <a:rPr lang="en-US" i="1">
+                                        <a:latin typeface="Cambria Math" panose="02040503050406030204" pitchFamily="18" charset="0"/>
+                                      </a:rPr>
+                                      <m:t>𝑘</m:t>
+                                    </m:r>
+                                  </m:sup>
+                                </m:sSup>
+                              </m:e>
+                            </m:d>
+                          </m:e>
+                        </m:d>
+                      </m:e>
+                      <m:sup>
+                        <m:r>
+                          <a:rPr lang="en-US" i="1">
+                            <a:latin typeface="Cambria Math" panose="02040503050406030204" pitchFamily="18" charset="0"/>
+                          </a:rPr>
+                          <m:t>2</m:t>
+                        </m:r>
+                      </m:sup>
+                    </m:sSup>
+                  </m:oMath>
+                </a14:m>
+                <a:r>
+                  <a:rPr lang="en-US" dirty="0"/>
+                  <a:t> for a given c</a:t>
+                </a:r>
+              </a:p>
+            </p:txBody>
+          </p:sp>
+        </mc:Choice>
+        <mc:Fallback>
+          <p:sp>
+            <p:nvSpPr>
+              <p:cNvPr id="5" name="TextBox 4">
+                <a:extLst>
+                  <a:ext uri="{FF2B5EF4-FFF2-40B4-BE49-F238E27FC236}">
+                    <a16:creationId xmlns:a16="http://schemas.microsoft.com/office/drawing/2014/main" id="{4F349155-E879-A04C-A3E4-54E7AF84C491}"/>
+                  </a:ext>
+                </a:extLst>
+              </p:cNvPr>
+              <p:cNvSpPr txBox="1">
+                <a:spLocks noRot="1" noChangeAspect="1" noMove="1" noResize="1" noEditPoints="1" noAdjustHandles="1" noChangeArrowheads="1" noChangeShapeType="1" noTextEdit="1"/>
+              </p:cNvSpPr>
+              <p:nvPr/>
+            </p:nvSpPr>
+            <p:spPr>
+              <a:xfrm>
+                <a:off x="3699990" y="5121222"/>
+                <a:ext cx="6302816" cy="459678"/>
+              </a:xfrm>
+              <a:prstGeom prst="rect">
+                <a:avLst/>
+              </a:prstGeom>
+              <a:blipFill>
+                <a:blip r:embed="rId5"/>
+                <a:stretch>
+                  <a:fillRect l="-602" b="-16216"/>
+                </a:stretch>
+              </a:blipFill>
+            </p:spPr>
+            <p:txBody>
+              <a:bodyPr/>
+              <a:lstStyle/>
+              <a:p>
+                <a:r>
+                  <a:rPr lang="en-US">
+                    <a:noFill/>
+                  </a:rPr>
+                  <a:t> </a:t>
+                </a:r>
+              </a:p>
+            </p:txBody>
+          </p:sp>
+        </mc:Fallback>
+      </mc:AlternateContent>
+      <p:cxnSp>
+        <p:nvCxnSpPr>
+          <p:cNvPr id="17" name="Straight Arrow Connector 16">
+            <a:extLst>
+              <a:ext uri="{FF2B5EF4-FFF2-40B4-BE49-F238E27FC236}">
+                <a16:creationId xmlns:a16="http://schemas.microsoft.com/office/drawing/2014/main" id="{6273339B-80A7-3C45-9FD6-26CAC5285263}"/>
+              </a:ext>
+            </a:extLst>
+          </p:cNvPr>
+          <p:cNvCxnSpPr/>
+          <p:nvPr/>
+        </p:nvCxnSpPr>
+        <p:spPr>
+          <a:xfrm flipH="1" flipV="1">
+            <a:off x="3465095" y="4106779"/>
+            <a:ext cx="304800" cy="812458"/>
+          </a:xfrm>
+          <a:prstGeom prst="straightConnector1">
+            <a:avLst/>
+          </a:prstGeom>
+          <a:ln>
+            <a:tailEnd type="triangle"/>
+          </a:ln>
+        </p:spPr>
+        <p:style>
+          <a:lnRef idx="1">
+            <a:schemeClr val="accent1"/>
+          </a:lnRef>
+          <a:fillRef idx="0">
+            <a:schemeClr val="accent1"/>
+          </a:fillRef>
+          <a:effectRef idx="0">
+            <a:schemeClr val="accent1"/>
+          </a:effectRef>
+          <a:fontRef idx="minor">
+            <a:schemeClr val="tx1"/>
+          </a:fontRef>
+        </p:style>
+      </p:cxnSp>
     </p:spTree>
     <p:extLst>
       <p:ext uri="{BB962C8B-B14F-4D97-AF65-F5344CB8AC3E}">
@@ -27626,6 +29184,109 @@
           </a:prstGeom>
         </p:spPr>
       </p:pic>
+      <mc:AlternateContent xmlns:mc="http://schemas.openxmlformats.org/markup-compatibility/2006">
+        <mc:Choice xmlns:a14="http://schemas.microsoft.com/office/drawing/2010/main" Requires="a14">
+          <p:sp>
+            <p:nvSpPr>
+              <p:cNvPr id="7" name="TextBox 6">
+                <a:extLst>
+                  <a:ext uri="{FF2B5EF4-FFF2-40B4-BE49-F238E27FC236}">
+                    <a16:creationId xmlns:a16="http://schemas.microsoft.com/office/drawing/2014/main" id="{3AC58FE5-4C0D-5E4E-A871-47A5CFF0E8A1}"/>
+                  </a:ext>
+                </a:extLst>
+              </p:cNvPr>
+              <p:cNvSpPr txBox="1"/>
+              <p:nvPr/>
+            </p:nvSpPr>
+            <p:spPr>
+              <a:xfrm>
+                <a:off x="6319019" y="5474707"/>
+                <a:ext cx="1786323" cy="369332"/>
+              </a:xfrm>
+              <a:prstGeom prst="rect">
+                <a:avLst/>
+              </a:prstGeom>
+              <a:noFill/>
+            </p:spPr>
+            <p:txBody>
+              <a:bodyPr wrap="none" rtlCol="0">
+                <a:spAutoFit/>
+              </a:bodyPr>
+              <a:lstStyle/>
+              <a:p>
+                <a:r>
+                  <a:rPr lang="en-US" dirty="0"/>
+                  <a:t>What is </a:t>
+                </a:r>
+                <a14:m>
+                  <m:oMath xmlns:m="http://schemas.openxmlformats.org/officeDocument/2006/math">
+                    <m:r>
+                      <a:rPr lang="en-US" i="1">
+                        <a:latin typeface="Cambria Math" panose="02040503050406030204" pitchFamily="18" charset="0"/>
+                      </a:rPr>
+                      <m:t>𝛽</m:t>
+                    </m:r>
+                    <m:r>
+                      <a:rPr lang="en-US" i="1">
+                        <a:latin typeface="Cambria Math" panose="02040503050406030204" pitchFamily="18" charset="0"/>
+                      </a:rPr>
+                      <m:t> </m:t>
+                    </m:r>
+                  </m:oMath>
+                </a14:m>
+                <a:r>
+                  <a:rPr lang="en-US" dirty="0"/>
+                  <a:t> here?</a:t>
+                </a:r>
+              </a:p>
+            </p:txBody>
+          </p:sp>
+        </mc:Choice>
+        <mc:Fallback>
+          <p:sp>
+            <p:nvSpPr>
+              <p:cNvPr id="7" name="TextBox 6">
+                <a:extLst>
+                  <a:ext uri="{FF2B5EF4-FFF2-40B4-BE49-F238E27FC236}">
+                    <a16:creationId xmlns:a16="http://schemas.microsoft.com/office/drawing/2014/main" id="{3AC58FE5-4C0D-5E4E-A871-47A5CFF0E8A1}"/>
+                  </a:ext>
+                </a:extLst>
+              </p:cNvPr>
+              <p:cNvSpPr txBox="1">
+                <a:spLocks noRot="1" noChangeAspect="1" noMove="1" noResize="1" noEditPoints="1" noAdjustHandles="1" noChangeArrowheads="1" noChangeShapeType="1" noTextEdit="1"/>
+              </p:cNvSpPr>
+              <p:nvPr/>
+            </p:nvSpPr>
+            <p:spPr>
+              <a:xfrm>
+                <a:off x="6319019" y="5474707"/>
+                <a:ext cx="1786323" cy="369332"/>
+              </a:xfrm>
+              <a:prstGeom prst="rect">
+                <a:avLst/>
+              </a:prstGeom>
+              <a:blipFill>
+                <a:blip r:embed="rId4"/>
+                <a:stretch>
+                  <a:fillRect l="-2837" t="-3333" b="-26667"/>
+                </a:stretch>
+              </a:blipFill>
+            </p:spPr>
+            <p:txBody>
+              <a:bodyPr/>
+              <a:lstStyle/>
+              <a:p>
+                <a:r>
+                  <a:rPr lang="en-US">
+                    <a:noFill/>
+                  </a:rPr>
+                  <a:t> </a:t>
+                </a:r>
+              </a:p>
+            </p:txBody>
+          </p:sp>
+        </mc:Fallback>
+      </mc:AlternateContent>
     </p:spTree>
     <p:extLst>
       <p:ext uri="{BB962C8B-B14F-4D97-AF65-F5344CB8AC3E}">
@@ -28025,8 +29686,8 @@
           </a:p>
         </p:txBody>
       </p:sp>
-      <mc:AlternateContent xmlns:mc="http://schemas.openxmlformats.org/markup-compatibility/2006" xmlns:a14="http://schemas.microsoft.com/office/drawing/2010/main">
-        <mc:Choice Requires="a14">
+      <mc:AlternateContent xmlns:mc="http://schemas.openxmlformats.org/markup-compatibility/2006">
+        <mc:Choice xmlns:a14="http://schemas.microsoft.com/office/drawing/2010/main" Requires="a14">
           <p:sp>
             <p:nvSpPr>
               <p:cNvPr id="4" name="Content Placeholder 3"/>
@@ -28346,26 +30007,15 @@
                 <a:endParaRPr lang="en-US" b="0" dirty="0"/>
               </a:p>
               <a:p>
-                <a:pPr lvl="1"/>
-                <a:r>
-                  <a:rPr lang="en-US" dirty="0"/>
-                  <a:t>Not a start</a:t>
-                </a:r>
-                <a:endParaRPr lang="en-US" b="0" dirty="0"/>
-              </a:p>
-              <a:p>
-                <a:r>
-                  <a:rPr lang="en-US" b="0" dirty="0"/>
-                  <a:t>Will draw pictures on board</a:t>
-                </a:r>
-              </a:p>
-              <a:p>
+                <a:pPr marL="0" indent="0">
+                  <a:buNone/>
+                </a:pPr>
                 <a:endParaRPr lang="en-US" dirty="0"/>
               </a:p>
             </p:txBody>
           </p:sp>
         </mc:Choice>
-        <mc:Fallback xmlns="">
+        <mc:Fallback>
           <p:sp>
             <p:nvSpPr>
               <p:cNvPr id="4" name="Content Placeholder 3"/>
@@ -28380,7 +30030,7 @@
               <a:blipFill>
                 <a:blip r:embed="rId2"/>
                 <a:stretch>
-                  <a:fillRect l="-1455" t="-1549"/>
+                  <a:fillRect l="-1261" t="-1462"/>
                 </a:stretch>
               </a:blipFill>
             </p:spPr>
@@ -29105,8 +30755,8 @@
           </a:p>
         </p:txBody>
       </p:sp>
-      <mc:AlternateContent xmlns:mc="http://schemas.openxmlformats.org/markup-compatibility/2006" xmlns:a14="http://schemas.microsoft.com/office/drawing/2010/main">
-        <mc:Choice Requires="a14">
+      <mc:AlternateContent xmlns:mc="http://schemas.openxmlformats.org/markup-compatibility/2006">
+        <mc:Choice xmlns:a14="http://schemas.microsoft.com/office/drawing/2010/main" Requires="a14">
           <p:sp>
             <p:nvSpPr>
               <p:cNvPr id="4" name="Content Placeholder 3"/>
@@ -29794,13 +31444,13 @@
               <a:p>
                 <a:r>
                   <a:rPr lang="en-US" dirty="0"/>
-                  <a:t>Logistic loss </a:t>
+                  <a:t>Logistic loss is convex! </a:t>
                 </a:r>
               </a:p>
             </p:txBody>
           </p:sp>
         </mc:Choice>
-        <mc:Fallback xmlns="">
+        <mc:Fallback>
           <p:sp>
             <p:nvSpPr>
               <p:cNvPr id="4" name="Content Placeholder 3"/>
@@ -29815,7 +31465,7 @@
               <a:blipFill>
                 <a:blip r:embed="rId2"/>
                 <a:stretch>
-                  <a:fillRect l="-1455" t="-1549"/>
+                  <a:fillRect l="-1261" t="-1462"/>
                 </a:stretch>
               </a:blipFill>
             </p:spPr>
@@ -30323,11 +31973,11 @@
                       <a:schemeClr val="tx1"/>
                     </a:solidFill>
                   </a:rPr>
-                  <a:t>Is s</a:t>
+                  <a:t>Is the s</a:t>
                 </a:r>
                 <a:r>
                   <a:rPr lang="en-US" dirty="0"/>
-                  <a:t>ample is benign or malignant?</a:t>
+                  <a:t>ample benign or malignant?</a:t>
                 </a:r>
                 <a:br>
                   <a:rPr lang="en-US" dirty="0"/>
@@ -30668,7 +32318,7 @@
                 <a:off x="1097280" y="1539277"/>
                 <a:ext cx="5798470" cy="4329817"/>
               </a:xfrm>
-              <a:blipFill>
+              <a:blipFill rotWithShape="0">
                 <a:blip r:embed="rId2"/>
                 <a:stretch>
                   <a:fillRect l="-2524" t="-1549"/>
@@ -30996,6 +32646,1268 @@
 </p:sld>
 </file>
 
+<file path=ppt/slides/slide51.xml><?xml version="1.0" encoding="utf-8"?>
+<p:sld xmlns:a="http://schemas.openxmlformats.org/drawingml/2006/main" xmlns:r="http://schemas.openxmlformats.org/officeDocument/2006/relationships" xmlns:p="http://schemas.openxmlformats.org/presentationml/2006/main">
+  <p:cSld>
+    <p:spTree>
+      <p:nvGrpSpPr>
+        <p:cNvPr id="1" name=""/>
+        <p:cNvGrpSpPr/>
+        <p:nvPr/>
+      </p:nvGrpSpPr>
+      <p:grpSpPr>
+        <a:xfrm>
+          <a:off x="0" y="0"/>
+          <a:ext cx="0" cy="0"/>
+          <a:chOff x="0" y="0"/>
+          <a:chExt cx="0" cy="0"/>
+        </a:xfrm>
+      </p:grpSpPr>
+      <p:sp>
+        <p:nvSpPr>
+          <p:cNvPr id="2" name="Title 1">
+            <a:extLst>
+              <a:ext uri="{FF2B5EF4-FFF2-40B4-BE49-F238E27FC236}">
+                <a16:creationId xmlns:a16="http://schemas.microsoft.com/office/drawing/2014/main" id="{E1D396E8-7377-FD41-9B34-1087CADA428C}"/>
+              </a:ext>
+            </a:extLst>
+          </p:cNvPr>
+          <p:cNvSpPr>
+            <a:spLocks noGrp="1"/>
+          </p:cNvSpPr>
+          <p:nvPr>
+            <p:ph type="title"/>
+          </p:nvPr>
+        </p:nvSpPr>
+        <p:spPr/>
+        <p:txBody>
+          <a:bodyPr>
+            <a:normAutofit fontScale="90000"/>
+          </a:bodyPr>
+          <a:lstStyle/>
+          <a:p>
+            <a:r>
+              <a:rPr lang="en-US" dirty="0"/>
+              <a:t>Lab: Estimating the fundamental frequency and harmonics of an audio signal</a:t>
+            </a:r>
+          </a:p>
+        </p:txBody>
+      </p:sp>
+      <mc:AlternateContent xmlns:mc="http://schemas.openxmlformats.org/markup-compatibility/2006">
+        <mc:Choice xmlns:a14="http://schemas.microsoft.com/office/drawing/2010/main" Requires="a14">
+          <p:sp>
+            <p:nvSpPr>
+              <p:cNvPr id="3" name="Content Placeholder 2">
+                <a:extLst>
+                  <a:ext uri="{FF2B5EF4-FFF2-40B4-BE49-F238E27FC236}">
+                    <a16:creationId xmlns:a16="http://schemas.microsoft.com/office/drawing/2014/main" id="{6E3383E9-6575-9F47-A04C-41130FCDEA59}"/>
+                  </a:ext>
+                </a:extLst>
+              </p:cNvPr>
+              <p:cNvSpPr>
+                <a:spLocks noGrp="1"/>
+              </p:cNvSpPr>
+              <p:nvPr>
+                <p:ph idx="1"/>
+              </p:nvPr>
+            </p:nvSpPr>
+            <p:spPr/>
+            <p:txBody>
+              <a:bodyPr>
+                <a:normAutofit/>
+              </a:bodyPr>
+              <a:lstStyle/>
+              <a:p>
+                <a:r>
+                  <a:rPr lang="en-US" dirty="0"/>
+                  <a:t> Common audio signal model</a:t>
+                </a:r>
+              </a:p>
+              <a:p>
+                <a:pPr marL="0" indent="0" algn="ctr">
+                  <a:buNone/>
+                </a:pPr>
+                <a14:m>
+                  <m:oMath xmlns:m="http://schemas.openxmlformats.org/officeDocument/2006/math">
+                    <m:r>
+                      <a:rPr lang="en-US" b="0" i="1" smtClean="0">
+                        <a:latin typeface="Cambria Math" panose="02040503050406030204" pitchFamily="18" charset="0"/>
+                      </a:rPr>
+                      <m:t>𝑦</m:t>
+                    </m:r>
+                    <m:d>
+                      <m:dPr>
+                        <m:begChr m:val="["/>
+                        <m:endChr m:val="]"/>
+                        <m:ctrlPr>
+                          <a:rPr lang="en-US" b="0" i="1" smtClean="0">
+                            <a:latin typeface="Cambria Math" panose="02040503050406030204" pitchFamily="18" charset="0"/>
+                          </a:rPr>
+                        </m:ctrlPr>
+                      </m:dPr>
+                      <m:e>
+                        <m:r>
+                          <a:rPr lang="en-US" b="0" i="1" smtClean="0">
+                            <a:latin typeface="Cambria Math" panose="02040503050406030204" pitchFamily="18" charset="0"/>
+                          </a:rPr>
+                          <m:t>𝑛</m:t>
+                        </m:r>
+                      </m:e>
+                    </m:d>
+                    <m:r>
+                      <a:rPr lang="en-US" i="1">
+                        <a:latin typeface="Cambria Math" panose="02040503050406030204" pitchFamily="18" charset="0"/>
+                        <a:ea typeface="Cambria Math" panose="02040503050406030204" pitchFamily="18" charset="0"/>
+                      </a:rPr>
+                      <m:t>≈</m:t>
+                    </m:r>
+                    <m:r>
+                      <a:rPr lang="en-US" b="0" i="1" smtClean="0">
+                        <a:latin typeface="Cambria Math" panose="02040503050406030204" pitchFamily="18" charset="0"/>
+                        <a:ea typeface="Cambria Math" panose="02040503050406030204" pitchFamily="18" charset="0"/>
+                      </a:rPr>
+                      <m:t>𝑐</m:t>
+                    </m:r>
+                    <m:r>
+                      <a:rPr lang="en-US" b="0" i="1" smtClean="0">
+                        <a:latin typeface="Cambria Math" panose="02040503050406030204" pitchFamily="18" charset="0"/>
+                        <a:ea typeface="Cambria Math" panose="02040503050406030204" pitchFamily="18" charset="0"/>
+                      </a:rPr>
+                      <m:t>+</m:t>
+                    </m:r>
+                    <m:nary>
+                      <m:naryPr>
+                        <m:chr m:val="∑"/>
+                        <m:limLoc m:val="subSup"/>
+                        <m:ctrlPr>
+                          <a:rPr lang="en-US" b="0" i="1" smtClean="0">
+                            <a:latin typeface="Cambria Math" panose="02040503050406030204" pitchFamily="18" charset="0"/>
+                            <a:ea typeface="Cambria Math" panose="02040503050406030204" pitchFamily="18" charset="0"/>
+                          </a:rPr>
+                        </m:ctrlPr>
+                      </m:naryPr>
+                      <m:sub>
+                        <m:r>
+                          <m:rPr>
+                            <m:brk m:alnAt="25"/>
+                          </m:rPr>
+                          <a:rPr lang="en-US" b="0" i="1" smtClean="0">
+                            <a:latin typeface="Cambria Math" panose="02040503050406030204" pitchFamily="18" charset="0"/>
+                            <a:ea typeface="Cambria Math" panose="02040503050406030204" pitchFamily="18" charset="0"/>
+                          </a:rPr>
+                          <m:t>𝑗</m:t>
+                        </m:r>
+                        <m:r>
+                          <a:rPr lang="en-US" b="0" i="1" smtClean="0">
+                            <a:latin typeface="Cambria Math" panose="02040503050406030204" pitchFamily="18" charset="0"/>
+                            <a:ea typeface="Cambria Math" panose="02040503050406030204" pitchFamily="18" charset="0"/>
+                          </a:rPr>
+                          <m:t>=0</m:t>
+                        </m:r>
+                      </m:sub>
+                      <m:sup>
+                        <m:r>
+                          <a:rPr lang="en-US" b="0" i="1" smtClean="0">
+                            <a:latin typeface="Cambria Math" panose="02040503050406030204" pitchFamily="18" charset="0"/>
+                            <a:ea typeface="Cambria Math" panose="02040503050406030204" pitchFamily="18" charset="0"/>
+                          </a:rPr>
+                          <m:t>𝐽</m:t>
+                        </m:r>
+                        <m:r>
+                          <a:rPr lang="en-US" b="0" i="1" smtClean="0">
+                            <a:latin typeface="Cambria Math" panose="02040503050406030204" pitchFamily="18" charset="0"/>
+                            <a:ea typeface="Cambria Math" panose="02040503050406030204" pitchFamily="18" charset="0"/>
+                          </a:rPr>
+                          <m:t>−1</m:t>
+                        </m:r>
+                      </m:sup>
+                      <m:e>
+                        <m:sSub>
+                          <m:sSubPr>
+                            <m:ctrlPr>
+                              <a:rPr lang="en-US" b="0" i="1" smtClean="0">
+                                <a:latin typeface="Cambria Math" panose="02040503050406030204" pitchFamily="18" charset="0"/>
+                                <a:ea typeface="Cambria Math" panose="02040503050406030204" pitchFamily="18" charset="0"/>
+                              </a:rPr>
+                            </m:ctrlPr>
+                          </m:sSubPr>
+                          <m:e>
+                            <m:r>
+                              <a:rPr lang="en-US" b="0" i="1" smtClean="0">
+                                <a:latin typeface="Cambria Math" panose="02040503050406030204" pitchFamily="18" charset="0"/>
+                                <a:ea typeface="Cambria Math" panose="02040503050406030204" pitchFamily="18" charset="0"/>
+                              </a:rPr>
+                              <m:t>𝑎</m:t>
+                            </m:r>
+                          </m:e>
+                          <m:sub>
+                            <m:r>
+                              <a:rPr lang="en-US" b="0" i="1" smtClean="0">
+                                <a:latin typeface="Cambria Math" panose="02040503050406030204" pitchFamily="18" charset="0"/>
+                                <a:ea typeface="Cambria Math" panose="02040503050406030204" pitchFamily="18" charset="0"/>
+                              </a:rPr>
+                              <m:t>𝑗</m:t>
+                            </m:r>
+                          </m:sub>
+                        </m:sSub>
+                        <m:func>
+                          <m:funcPr>
+                            <m:ctrlPr>
+                              <a:rPr lang="en-US" b="0" i="1" smtClean="0">
+                                <a:latin typeface="Cambria Math" panose="02040503050406030204" pitchFamily="18" charset="0"/>
+                                <a:ea typeface="Cambria Math" panose="02040503050406030204" pitchFamily="18" charset="0"/>
+                              </a:rPr>
+                            </m:ctrlPr>
+                          </m:funcPr>
+                          <m:fName>
+                            <m:r>
+                              <m:rPr>
+                                <m:sty m:val="p"/>
+                              </m:rPr>
+                              <a:rPr lang="en-US" b="0" i="0" smtClean="0">
+                                <a:latin typeface="Cambria Math" panose="02040503050406030204" pitchFamily="18" charset="0"/>
+                                <a:ea typeface="Cambria Math" panose="02040503050406030204" pitchFamily="18" charset="0"/>
+                              </a:rPr>
+                              <m:t>cos</m:t>
+                            </m:r>
+                          </m:fName>
+                          <m:e>
+                            <m:r>
+                              <a:rPr lang="en-US" b="0" i="1" smtClean="0">
+                                <a:latin typeface="Cambria Math" panose="02040503050406030204" pitchFamily="18" charset="0"/>
+                                <a:ea typeface="Cambria Math" panose="02040503050406030204" pitchFamily="18" charset="0"/>
+                              </a:rPr>
+                              <m:t>2</m:t>
+                            </m:r>
+                            <m:r>
+                              <a:rPr lang="en-US" b="0" i="1" smtClean="0">
+                                <a:latin typeface="Cambria Math" panose="02040503050406030204" pitchFamily="18" charset="0"/>
+                                <a:ea typeface="Cambria Math" panose="02040503050406030204" pitchFamily="18" charset="0"/>
+                              </a:rPr>
+                              <m:t>𝜋</m:t>
+                            </m:r>
+                            <m:d>
+                              <m:dPr>
+                                <m:ctrlPr>
+                                  <a:rPr lang="en-US" b="0" i="1" smtClean="0">
+                                    <a:latin typeface="Cambria Math" panose="02040503050406030204" pitchFamily="18" charset="0"/>
+                                    <a:ea typeface="Cambria Math" panose="02040503050406030204" pitchFamily="18" charset="0"/>
+                                  </a:rPr>
+                                </m:ctrlPr>
+                              </m:dPr>
+                              <m:e>
+                                <m:r>
+                                  <a:rPr lang="en-US" b="0" i="1" smtClean="0">
+                                    <a:latin typeface="Cambria Math" panose="02040503050406030204" pitchFamily="18" charset="0"/>
+                                    <a:ea typeface="Cambria Math" panose="02040503050406030204" pitchFamily="18" charset="0"/>
+                                  </a:rPr>
+                                  <m:t>𝑗</m:t>
+                                </m:r>
+                                <m:r>
+                                  <a:rPr lang="en-US" b="0" i="1" smtClean="0">
+                                    <a:latin typeface="Cambria Math" panose="02040503050406030204" pitchFamily="18" charset="0"/>
+                                    <a:ea typeface="Cambria Math" panose="02040503050406030204" pitchFamily="18" charset="0"/>
+                                  </a:rPr>
+                                  <m:t>+1</m:t>
+                                </m:r>
+                              </m:e>
+                            </m:d>
+                            <m:sSub>
+                              <m:sSubPr>
+                                <m:ctrlPr>
+                                  <a:rPr lang="en-US" b="0" i="1" smtClean="0">
+                                    <a:latin typeface="Cambria Math" panose="02040503050406030204" pitchFamily="18" charset="0"/>
+                                    <a:ea typeface="Cambria Math" panose="02040503050406030204" pitchFamily="18" charset="0"/>
+                                  </a:rPr>
+                                </m:ctrlPr>
+                              </m:sSubPr>
+                              <m:e>
+                                <m:r>
+                                  <a:rPr lang="en-US" b="0" i="1" smtClean="0">
+                                    <a:latin typeface="Cambria Math" panose="02040503050406030204" pitchFamily="18" charset="0"/>
+                                    <a:ea typeface="Cambria Math" panose="02040503050406030204" pitchFamily="18" charset="0"/>
+                                  </a:rPr>
+                                  <m:t>𝑓</m:t>
+                                </m:r>
+                              </m:e>
+                              <m:sub>
+                                <m:r>
+                                  <a:rPr lang="en-US" b="0" i="1" smtClean="0">
+                                    <a:latin typeface="Cambria Math" panose="02040503050406030204" pitchFamily="18" charset="0"/>
+                                    <a:ea typeface="Cambria Math" panose="02040503050406030204" pitchFamily="18" charset="0"/>
+                                  </a:rPr>
+                                  <m:t>0</m:t>
+                                </m:r>
+                              </m:sub>
+                            </m:sSub>
+                            <m:r>
+                              <a:rPr lang="en-US" b="0" i="1" smtClean="0">
+                                <a:latin typeface="Cambria Math" panose="02040503050406030204" pitchFamily="18" charset="0"/>
+                                <a:ea typeface="Cambria Math" panose="02040503050406030204" pitchFamily="18" charset="0"/>
+                              </a:rPr>
+                              <m:t>𝑛</m:t>
+                            </m:r>
+                            <m:sSub>
+                              <m:sSubPr>
+                                <m:ctrlPr>
+                                  <a:rPr lang="en-US" i="1">
+                                    <a:latin typeface="Cambria Math" panose="02040503050406030204" pitchFamily="18" charset="0"/>
+                                    <a:ea typeface="Cambria Math" panose="02040503050406030204" pitchFamily="18" charset="0"/>
+                                  </a:rPr>
+                                </m:ctrlPr>
+                              </m:sSubPr>
+                              <m:e>
+                                <m:r>
+                                  <a:rPr lang="en-US" b="0" i="1" smtClean="0">
+                                    <a:latin typeface="Cambria Math" panose="02040503050406030204" pitchFamily="18" charset="0"/>
+                                    <a:ea typeface="Cambria Math" panose="02040503050406030204" pitchFamily="18" charset="0"/>
+                                  </a:rPr>
+                                  <m:t>𝑇</m:t>
+                                </m:r>
+                              </m:e>
+                              <m:sub>
+                                <m:r>
+                                  <a:rPr lang="en-US" i="1">
+                                    <a:latin typeface="Cambria Math" panose="02040503050406030204" pitchFamily="18" charset="0"/>
+                                    <a:ea typeface="Cambria Math" panose="02040503050406030204" pitchFamily="18" charset="0"/>
+                                  </a:rPr>
+                                  <m:t>𝑠</m:t>
+                                </m:r>
+                              </m:sub>
+                            </m:sSub>
+                            <m:r>
+                              <a:rPr lang="en-US" b="0" i="1" smtClean="0">
+                                <a:latin typeface="Cambria Math" panose="02040503050406030204" pitchFamily="18" charset="0"/>
+                                <a:ea typeface="Cambria Math" panose="02040503050406030204" pitchFamily="18" charset="0"/>
+                              </a:rPr>
+                              <m:t>+</m:t>
+                            </m:r>
+                          </m:e>
+                        </m:func>
+                      </m:e>
+                    </m:nary>
+                  </m:oMath>
+                </a14:m>
+                <a:r>
+                  <a:rPr lang="en-US" dirty="0">
+                    <a:ea typeface="Cambria Math" panose="02040503050406030204" pitchFamily="18" charset="0"/>
+                  </a:rPr>
+                  <a:t> </a:t>
+                </a:r>
+                <a14:m>
+                  <m:oMath xmlns:m="http://schemas.openxmlformats.org/officeDocument/2006/math">
+                    <m:nary>
+                      <m:naryPr>
+                        <m:chr m:val="∑"/>
+                        <m:limLoc m:val="subSup"/>
+                        <m:ctrlPr>
+                          <a:rPr lang="en-US" i="1">
+                            <a:latin typeface="Cambria Math" panose="02040503050406030204" pitchFamily="18" charset="0"/>
+                            <a:ea typeface="Cambria Math" panose="02040503050406030204" pitchFamily="18" charset="0"/>
+                          </a:rPr>
+                        </m:ctrlPr>
+                      </m:naryPr>
+                      <m:sub>
+                        <m:r>
+                          <m:rPr>
+                            <m:brk m:alnAt="25"/>
+                          </m:rPr>
+                          <a:rPr lang="en-US" i="1">
+                            <a:latin typeface="Cambria Math" panose="02040503050406030204" pitchFamily="18" charset="0"/>
+                            <a:ea typeface="Cambria Math" panose="02040503050406030204" pitchFamily="18" charset="0"/>
+                          </a:rPr>
+                          <m:t>𝑗</m:t>
+                        </m:r>
+                        <m:r>
+                          <a:rPr lang="en-US" i="1">
+                            <a:latin typeface="Cambria Math" panose="02040503050406030204" pitchFamily="18" charset="0"/>
+                            <a:ea typeface="Cambria Math" panose="02040503050406030204" pitchFamily="18" charset="0"/>
+                          </a:rPr>
+                          <m:t>=0</m:t>
+                        </m:r>
+                      </m:sub>
+                      <m:sup>
+                        <m:r>
+                          <a:rPr lang="en-US" i="1">
+                            <a:latin typeface="Cambria Math" panose="02040503050406030204" pitchFamily="18" charset="0"/>
+                            <a:ea typeface="Cambria Math" panose="02040503050406030204" pitchFamily="18" charset="0"/>
+                          </a:rPr>
+                          <m:t>𝐽</m:t>
+                        </m:r>
+                        <m:r>
+                          <a:rPr lang="en-US" i="1">
+                            <a:latin typeface="Cambria Math" panose="02040503050406030204" pitchFamily="18" charset="0"/>
+                            <a:ea typeface="Cambria Math" panose="02040503050406030204" pitchFamily="18" charset="0"/>
+                          </a:rPr>
+                          <m:t>−1</m:t>
+                        </m:r>
+                      </m:sup>
+                      <m:e>
+                        <m:sSub>
+                          <m:sSubPr>
+                            <m:ctrlPr>
+                              <a:rPr lang="en-US" i="1">
+                                <a:latin typeface="Cambria Math" panose="02040503050406030204" pitchFamily="18" charset="0"/>
+                                <a:ea typeface="Cambria Math" panose="02040503050406030204" pitchFamily="18" charset="0"/>
+                              </a:rPr>
+                            </m:ctrlPr>
+                          </m:sSubPr>
+                          <m:e>
+                            <m:r>
+                              <a:rPr lang="en-US" b="0" i="1" smtClean="0">
+                                <a:latin typeface="Cambria Math" panose="02040503050406030204" pitchFamily="18" charset="0"/>
+                                <a:ea typeface="Cambria Math" panose="02040503050406030204" pitchFamily="18" charset="0"/>
+                              </a:rPr>
+                              <m:t>𝑏</m:t>
+                            </m:r>
+                          </m:e>
+                          <m:sub>
+                            <m:r>
+                              <a:rPr lang="en-US" i="1">
+                                <a:latin typeface="Cambria Math" panose="02040503050406030204" pitchFamily="18" charset="0"/>
+                                <a:ea typeface="Cambria Math" panose="02040503050406030204" pitchFamily="18" charset="0"/>
+                              </a:rPr>
+                              <m:t>𝑗</m:t>
+                            </m:r>
+                          </m:sub>
+                        </m:sSub>
+                        <m:func>
+                          <m:funcPr>
+                            <m:ctrlPr>
+                              <a:rPr lang="en-US" i="1">
+                                <a:latin typeface="Cambria Math" panose="02040503050406030204" pitchFamily="18" charset="0"/>
+                                <a:ea typeface="Cambria Math" panose="02040503050406030204" pitchFamily="18" charset="0"/>
+                              </a:rPr>
+                            </m:ctrlPr>
+                          </m:funcPr>
+                          <m:fName>
+                            <m:func>
+                              <m:funcPr>
+                                <m:ctrlPr>
+                                  <a:rPr lang="en-US" i="1" smtClean="0">
+                                    <a:latin typeface="Cambria Math" panose="02040503050406030204" pitchFamily="18" charset="0"/>
+                                    <a:ea typeface="Cambria Math" panose="02040503050406030204" pitchFamily="18" charset="0"/>
+                                  </a:rPr>
+                                </m:ctrlPr>
+                              </m:funcPr>
+                              <m:fName>
+                                <m:r>
+                                  <m:rPr>
+                                    <m:sty m:val="p"/>
+                                  </m:rPr>
+                                  <a:rPr lang="en-US" i="0" smtClean="0">
+                                    <a:latin typeface="Cambria Math" panose="02040503050406030204" pitchFamily="18" charset="0"/>
+                                    <a:ea typeface="Cambria Math" panose="02040503050406030204" pitchFamily="18" charset="0"/>
+                                  </a:rPr>
+                                  <m:t>sin</m:t>
+                                </m:r>
+                              </m:fName>
+                              <m:e>
+                                <m:r>
+                                  <a:rPr lang="en-US" i="1">
+                                    <a:latin typeface="Cambria Math" panose="02040503050406030204" pitchFamily="18" charset="0"/>
+                                    <a:ea typeface="Cambria Math" panose="02040503050406030204" pitchFamily="18" charset="0"/>
+                                  </a:rPr>
+                                  <m:t>2</m:t>
+                                </m:r>
+                                <m:r>
+                                  <a:rPr lang="en-US" i="1">
+                                    <a:latin typeface="Cambria Math" panose="02040503050406030204" pitchFamily="18" charset="0"/>
+                                    <a:ea typeface="Cambria Math" panose="02040503050406030204" pitchFamily="18" charset="0"/>
+                                  </a:rPr>
+                                  <m:t>𝜋</m:t>
+                                </m:r>
+                                <m:d>
+                                  <m:dPr>
+                                    <m:ctrlPr>
+                                      <a:rPr lang="en-US" i="1">
+                                        <a:latin typeface="Cambria Math" panose="02040503050406030204" pitchFamily="18" charset="0"/>
+                                        <a:ea typeface="Cambria Math" panose="02040503050406030204" pitchFamily="18" charset="0"/>
+                                      </a:rPr>
+                                    </m:ctrlPr>
+                                  </m:dPr>
+                                  <m:e>
+                                    <m:r>
+                                      <a:rPr lang="en-US" i="1">
+                                        <a:latin typeface="Cambria Math" panose="02040503050406030204" pitchFamily="18" charset="0"/>
+                                        <a:ea typeface="Cambria Math" panose="02040503050406030204" pitchFamily="18" charset="0"/>
+                                      </a:rPr>
+                                      <m:t>𝑗</m:t>
+                                    </m:r>
+                                    <m:r>
+                                      <a:rPr lang="en-US" i="1">
+                                        <a:latin typeface="Cambria Math" panose="02040503050406030204" pitchFamily="18" charset="0"/>
+                                        <a:ea typeface="Cambria Math" panose="02040503050406030204" pitchFamily="18" charset="0"/>
+                                      </a:rPr>
+                                      <m:t>+1</m:t>
+                                    </m:r>
+                                  </m:e>
+                                </m:d>
+                                <m:sSub>
+                                  <m:sSubPr>
+                                    <m:ctrlPr>
+                                      <a:rPr lang="en-US" i="1">
+                                        <a:latin typeface="Cambria Math" panose="02040503050406030204" pitchFamily="18" charset="0"/>
+                                        <a:ea typeface="Cambria Math" panose="02040503050406030204" pitchFamily="18" charset="0"/>
+                                      </a:rPr>
+                                    </m:ctrlPr>
+                                  </m:sSubPr>
+                                  <m:e>
+                                    <m:r>
+                                      <a:rPr lang="en-US" i="1">
+                                        <a:latin typeface="Cambria Math" panose="02040503050406030204" pitchFamily="18" charset="0"/>
+                                        <a:ea typeface="Cambria Math" panose="02040503050406030204" pitchFamily="18" charset="0"/>
+                                      </a:rPr>
+                                      <m:t>𝑓</m:t>
+                                    </m:r>
+                                  </m:e>
+                                  <m:sub>
+                                    <m:r>
+                                      <a:rPr lang="en-US" i="1">
+                                        <a:latin typeface="Cambria Math" panose="02040503050406030204" pitchFamily="18" charset="0"/>
+                                        <a:ea typeface="Cambria Math" panose="02040503050406030204" pitchFamily="18" charset="0"/>
+                                      </a:rPr>
+                                      <m:t>0</m:t>
+                                    </m:r>
+                                  </m:sub>
+                                </m:sSub>
+                                <m:r>
+                                  <a:rPr lang="en-US" b="0" i="1" smtClean="0">
+                                    <a:latin typeface="Cambria Math" panose="02040503050406030204" pitchFamily="18" charset="0"/>
+                                    <a:ea typeface="Cambria Math" panose="02040503050406030204" pitchFamily="18" charset="0"/>
+                                  </a:rPr>
+                                  <m:t>𝑛</m:t>
+                                </m:r>
+                                <m:sSub>
+                                  <m:sSubPr>
+                                    <m:ctrlPr>
+                                      <a:rPr lang="en-US" i="1">
+                                        <a:latin typeface="Cambria Math" panose="02040503050406030204" pitchFamily="18" charset="0"/>
+                                        <a:ea typeface="Cambria Math" panose="02040503050406030204" pitchFamily="18" charset="0"/>
+                                      </a:rPr>
+                                    </m:ctrlPr>
+                                  </m:sSubPr>
+                                  <m:e>
+                                    <m:r>
+                                      <a:rPr lang="en-US" i="1">
+                                        <a:latin typeface="Cambria Math" panose="02040503050406030204" pitchFamily="18" charset="0"/>
+                                        <a:ea typeface="Cambria Math" panose="02040503050406030204" pitchFamily="18" charset="0"/>
+                                      </a:rPr>
+                                      <m:t>𝑇</m:t>
+                                    </m:r>
+                                  </m:e>
+                                  <m:sub>
+                                    <m:r>
+                                      <a:rPr lang="en-US" i="1">
+                                        <a:latin typeface="Cambria Math" panose="02040503050406030204" pitchFamily="18" charset="0"/>
+                                        <a:ea typeface="Cambria Math" panose="02040503050406030204" pitchFamily="18" charset="0"/>
+                                      </a:rPr>
+                                      <m:t>𝑠</m:t>
+                                    </m:r>
+                                  </m:sub>
+                                </m:sSub>
+                              </m:e>
+                            </m:func>
+                          </m:fName>
+                          <m:e/>
+                        </m:func>
+                      </m:e>
+                    </m:nary>
+                  </m:oMath>
+                </a14:m>
+                <a:endParaRPr lang="en-US" dirty="0"/>
+              </a:p>
+              <a:p>
+                <a:pPr marL="292608" lvl="1" indent="0">
+                  <a:buNone/>
+                </a:pPr>
+                <a14:m>
+                  <m:oMath xmlns:m="http://schemas.openxmlformats.org/officeDocument/2006/math">
+                    <m:sSub>
+                      <m:sSubPr>
+                        <m:ctrlPr>
+                          <a:rPr lang="en-US" i="1">
+                            <a:latin typeface="Cambria Math" panose="02040503050406030204" pitchFamily="18" charset="0"/>
+                            <a:ea typeface="Cambria Math" panose="02040503050406030204" pitchFamily="18" charset="0"/>
+                          </a:rPr>
+                        </m:ctrlPr>
+                      </m:sSubPr>
+                      <m:e>
+                        <m:r>
+                          <a:rPr lang="en-US" b="0" i="1" smtClean="0">
+                            <a:latin typeface="Cambria Math" panose="02040503050406030204" pitchFamily="18" charset="0"/>
+                            <a:ea typeface="Cambria Math" panose="02040503050406030204" pitchFamily="18" charset="0"/>
+                          </a:rPr>
+                          <m:t> </m:t>
+                        </m:r>
+                        <m:r>
+                          <a:rPr lang="en-US" i="1">
+                            <a:latin typeface="Cambria Math" panose="02040503050406030204" pitchFamily="18" charset="0"/>
+                            <a:ea typeface="Cambria Math" panose="02040503050406030204" pitchFamily="18" charset="0"/>
+                          </a:rPr>
+                          <m:t>𝑓</m:t>
+                        </m:r>
+                      </m:e>
+                      <m:sub>
+                        <m:r>
+                          <a:rPr lang="en-US" i="1">
+                            <a:latin typeface="Cambria Math" panose="02040503050406030204" pitchFamily="18" charset="0"/>
+                            <a:ea typeface="Cambria Math" panose="02040503050406030204" pitchFamily="18" charset="0"/>
+                          </a:rPr>
+                          <m:t>0</m:t>
+                        </m:r>
+                      </m:sub>
+                    </m:sSub>
+                  </m:oMath>
+                </a14:m>
+                <a:r>
+                  <a:rPr lang="en-US" dirty="0"/>
+                  <a:t> :    fundamental frequency (pitch period = 1/</a:t>
+                </a:r>
+                <a:r>
+                  <a:rPr lang="en-US" dirty="0">
+                    <a:ea typeface="Cambria Math" panose="02040503050406030204" pitchFamily="18" charset="0"/>
+                  </a:rPr>
+                  <a:t> </a:t>
+                </a:r>
+                <a14:m>
+                  <m:oMath xmlns:m="http://schemas.openxmlformats.org/officeDocument/2006/math">
+                    <m:sSub>
+                      <m:sSubPr>
+                        <m:ctrlPr>
+                          <a:rPr lang="en-US" i="1">
+                            <a:latin typeface="Cambria Math" panose="02040503050406030204" pitchFamily="18" charset="0"/>
+                            <a:ea typeface="Cambria Math" panose="02040503050406030204" pitchFamily="18" charset="0"/>
+                          </a:rPr>
+                        </m:ctrlPr>
+                      </m:sSubPr>
+                      <m:e>
+                        <m:r>
+                          <a:rPr lang="en-US" i="1">
+                            <a:latin typeface="Cambria Math" panose="02040503050406030204" pitchFamily="18" charset="0"/>
+                            <a:ea typeface="Cambria Math" panose="02040503050406030204" pitchFamily="18" charset="0"/>
+                          </a:rPr>
+                          <m:t>𝑓</m:t>
+                        </m:r>
+                      </m:e>
+                      <m:sub>
+                        <m:r>
+                          <a:rPr lang="en-US" i="1">
+                            <a:latin typeface="Cambria Math" panose="02040503050406030204" pitchFamily="18" charset="0"/>
+                            <a:ea typeface="Cambria Math" panose="02040503050406030204" pitchFamily="18" charset="0"/>
+                          </a:rPr>
+                          <m:t>0</m:t>
+                        </m:r>
+                      </m:sub>
+                    </m:sSub>
+                  </m:oMath>
+                </a14:m>
+                <a:r>
+                  <a:rPr lang="en-US" dirty="0"/>
+                  <a:t>)</a:t>
+                </a:r>
+              </a:p>
+              <a:p>
+                <a:pPr marL="292608" lvl="1" indent="0">
+                  <a:buNone/>
+                </a:pPr>
+                <a:r>
+                  <a:rPr lang="en-US" dirty="0">
+                    <a:ea typeface="Cambria Math" panose="02040503050406030204" pitchFamily="18" charset="0"/>
+                  </a:rPr>
+                  <a:t> </a:t>
+                </a:r>
+                <a14:m>
+                  <m:oMath xmlns:m="http://schemas.openxmlformats.org/officeDocument/2006/math">
+                    <m:sSub>
+                      <m:sSubPr>
+                        <m:ctrlPr>
+                          <a:rPr lang="en-US" i="1">
+                            <a:latin typeface="Cambria Math" panose="02040503050406030204" pitchFamily="18" charset="0"/>
+                            <a:ea typeface="Cambria Math" panose="02040503050406030204" pitchFamily="18" charset="0"/>
+                          </a:rPr>
+                        </m:ctrlPr>
+                      </m:sSubPr>
+                      <m:e>
+                        <m:r>
+                          <a:rPr lang="en-US" b="0" i="1" smtClean="0">
+                            <a:latin typeface="Cambria Math" panose="02040503050406030204" pitchFamily="18" charset="0"/>
+                            <a:ea typeface="Cambria Math" panose="02040503050406030204" pitchFamily="18" charset="0"/>
+                          </a:rPr>
+                          <m:t>𝑘</m:t>
+                        </m:r>
+                        <m:r>
+                          <a:rPr lang="en-US" b="0" i="1" smtClean="0">
+                            <a:latin typeface="Cambria Math" panose="02040503050406030204" pitchFamily="18" charset="0"/>
+                            <a:ea typeface="Cambria Math" panose="02040503050406030204" pitchFamily="18" charset="0"/>
+                          </a:rPr>
+                          <m:t> </m:t>
+                        </m:r>
+                        <m:r>
+                          <a:rPr lang="en-US" i="1">
+                            <a:latin typeface="Cambria Math" panose="02040503050406030204" pitchFamily="18" charset="0"/>
+                            <a:ea typeface="Cambria Math" panose="02040503050406030204" pitchFamily="18" charset="0"/>
+                          </a:rPr>
+                          <m:t>𝑓</m:t>
+                        </m:r>
+                      </m:e>
+                      <m:sub>
+                        <m:r>
+                          <a:rPr lang="en-US" i="1">
+                            <a:latin typeface="Cambria Math" panose="02040503050406030204" pitchFamily="18" charset="0"/>
+                            <a:ea typeface="Cambria Math" panose="02040503050406030204" pitchFamily="18" charset="0"/>
+                          </a:rPr>
+                          <m:t>0</m:t>
+                        </m:r>
+                      </m:sub>
+                    </m:sSub>
+                    <m:r>
+                      <a:rPr lang="en-US" b="0" i="0" smtClean="0">
+                        <a:latin typeface="Cambria Math" panose="02040503050406030204" pitchFamily="18" charset="0"/>
+                        <a:ea typeface="Cambria Math" panose="02040503050406030204" pitchFamily="18" charset="0"/>
+                      </a:rPr>
+                      <m:t>: </m:t>
+                    </m:r>
+                    <m:r>
+                      <m:rPr>
+                        <m:sty m:val="p"/>
+                      </m:rPr>
+                      <a:rPr lang="en-US" b="0" i="0" smtClean="0">
+                        <a:latin typeface="Cambria Math" panose="02040503050406030204" pitchFamily="18" charset="0"/>
+                        <a:ea typeface="Cambria Math" panose="02040503050406030204" pitchFamily="18" charset="0"/>
+                      </a:rPr>
+                      <m:t>harmonics</m:t>
+                    </m:r>
+                  </m:oMath>
+                </a14:m>
+                <a:endParaRPr lang="en-US" dirty="0"/>
+              </a:p>
+              <a:p>
+                <a:pPr marL="285750" indent="-285750"/>
+                <a:r>
+                  <a:rPr lang="en-US" dirty="0"/>
+                  <a:t>Problem: Given </a:t>
+                </a:r>
+                <a14:m>
+                  <m:oMath xmlns:m="http://schemas.openxmlformats.org/officeDocument/2006/math">
+                    <m:r>
+                      <a:rPr lang="en-US" i="1">
+                        <a:latin typeface="Cambria Math" panose="02040503050406030204" pitchFamily="18" charset="0"/>
+                        <a:ea typeface="Cambria Math" panose="02040503050406030204" pitchFamily="18" charset="0"/>
+                      </a:rPr>
+                      <m:t>𝐽</m:t>
+                    </m:r>
+                    <m:r>
+                      <a:rPr lang="en-US" i="1">
+                        <a:latin typeface="Cambria Math" panose="02040503050406030204" pitchFamily="18" charset="0"/>
+                        <a:ea typeface="Cambria Math" panose="02040503050406030204" pitchFamily="18" charset="0"/>
+                      </a:rPr>
+                      <m:t> </m:t>
+                    </m:r>
+                  </m:oMath>
+                </a14:m>
+                <a:r>
+                  <a:rPr lang="en-US" dirty="0"/>
+                  <a:t>, estimating </a:t>
+                </a:r>
+                <a14:m>
+                  <m:oMath xmlns:m="http://schemas.openxmlformats.org/officeDocument/2006/math">
+                    <m:sSub>
+                      <m:sSubPr>
+                        <m:ctrlPr>
+                          <a:rPr lang="en-US" i="1">
+                            <a:latin typeface="Cambria Math" panose="02040503050406030204" pitchFamily="18" charset="0"/>
+                            <a:ea typeface="Cambria Math" panose="02040503050406030204" pitchFamily="18" charset="0"/>
+                          </a:rPr>
+                        </m:ctrlPr>
+                      </m:sSubPr>
+                      <m:e>
+                        <m:r>
+                          <a:rPr lang="en-US" i="1">
+                            <a:latin typeface="Cambria Math" panose="02040503050406030204" pitchFamily="18" charset="0"/>
+                            <a:ea typeface="Cambria Math" panose="02040503050406030204" pitchFamily="18" charset="0"/>
+                          </a:rPr>
+                          <m:t>𝑓</m:t>
+                        </m:r>
+                      </m:e>
+                      <m:sub>
+                        <m:r>
+                          <a:rPr lang="en-US" i="1">
+                            <a:latin typeface="Cambria Math" panose="02040503050406030204" pitchFamily="18" charset="0"/>
+                            <a:ea typeface="Cambria Math" panose="02040503050406030204" pitchFamily="18" charset="0"/>
+                          </a:rPr>
+                          <m:t>0</m:t>
+                        </m:r>
+                      </m:sub>
+                    </m:sSub>
+                  </m:oMath>
+                </a14:m>
+                <a:r>
+                  <a:rPr lang="en-US" dirty="0"/>
+                  <a:t> and coefficients </a:t>
+                </a:r>
+                <a14:m>
+                  <m:oMath xmlns:m="http://schemas.openxmlformats.org/officeDocument/2006/math">
+                    <m:sSub>
+                      <m:sSubPr>
+                        <m:ctrlPr>
+                          <a:rPr lang="en-US" i="1">
+                            <a:latin typeface="Cambria Math" panose="02040503050406030204" pitchFamily="18" charset="0"/>
+                            <a:ea typeface="Cambria Math" panose="02040503050406030204" pitchFamily="18" charset="0"/>
+                          </a:rPr>
+                        </m:ctrlPr>
+                      </m:sSubPr>
+                      <m:e>
+                        <m:r>
+                          <a:rPr lang="en-US" b="0" i="1" smtClean="0">
+                            <a:latin typeface="Cambria Math" panose="02040503050406030204" pitchFamily="18" charset="0"/>
+                            <a:ea typeface="Cambria Math" panose="02040503050406030204" pitchFamily="18" charset="0"/>
+                          </a:rPr>
+                          <m:t>𝑐</m:t>
+                        </m:r>
+                        <m:r>
+                          <a:rPr lang="en-US" b="0" i="1" smtClean="0">
+                            <a:latin typeface="Cambria Math" panose="02040503050406030204" pitchFamily="18" charset="0"/>
+                            <a:ea typeface="Cambria Math" panose="02040503050406030204" pitchFamily="18" charset="0"/>
+                          </a:rPr>
+                          <m:t>, </m:t>
+                        </m:r>
+                        <m:r>
+                          <a:rPr lang="en-US" i="1">
+                            <a:latin typeface="Cambria Math" panose="02040503050406030204" pitchFamily="18" charset="0"/>
+                            <a:ea typeface="Cambria Math" panose="02040503050406030204" pitchFamily="18" charset="0"/>
+                          </a:rPr>
+                          <m:t>𝑎</m:t>
+                        </m:r>
+                      </m:e>
+                      <m:sub>
+                        <m:r>
+                          <a:rPr lang="en-US" i="1">
+                            <a:latin typeface="Cambria Math" panose="02040503050406030204" pitchFamily="18" charset="0"/>
+                            <a:ea typeface="Cambria Math" panose="02040503050406030204" pitchFamily="18" charset="0"/>
+                          </a:rPr>
+                          <m:t>𝑗</m:t>
+                        </m:r>
+                      </m:sub>
+                    </m:sSub>
+                  </m:oMath>
+                </a14:m>
+                <a:r>
+                  <a:rPr lang="en-US" dirty="0"/>
+                  <a:t>,</a:t>
+                </a:r>
+                <a:r>
+                  <a:rPr lang="en-US" dirty="0">
+                    <a:ea typeface="Cambria Math" panose="02040503050406030204" pitchFamily="18" charset="0"/>
+                  </a:rPr>
+                  <a:t> </a:t>
+                </a:r>
+                <a14:m>
+                  <m:oMath xmlns:m="http://schemas.openxmlformats.org/officeDocument/2006/math">
+                    <m:sSub>
+                      <m:sSubPr>
+                        <m:ctrlPr>
+                          <a:rPr lang="en-US" i="1">
+                            <a:latin typeface="Cambria Math" panose="02040503050406030204" pitchFamily="18" charset="0"/>
+                            <a:ea typeface="Cambria Math" panose="02040503050406030204" pitchFamily="18" charset="0"/>
+                          </a:rPr>
+                        </m:ctrlPr>
+                      </m:sSubPr>
+                      <m:e>
+                        <m:r>
+                          <a:rPr lang="en-US" i="1">
+                            <a:latin typeface="Cambria Math" panose="02040503050406030204" pitchFamily="18" charset="0"/>
+                            <a:ea typeface="Cambria Math" panose="02040503050406030204" pitchFamily="18" charset="0"/>
+                          </a:rPr>
+                          <m:t>𝑏</m:t>
+                        </m:r>
+                      </m:e>
+                      <m:sub>
+                        <m:r>
+                          <a:rPr lang="en-US" i="1">
+                            <a:latin typeface="Cambria Math" panose="02040503050406030204" pitchFamily="18" charset="0"/>
+                            <a:ea typeface="Cambria Math" panose="02040503050406030204" pitchFamily="18" charset="0"/>
+                          </a:rPr>
+                          <m:t>𝑗</m:t>
+                        </m:r>
+                      </m:sub>
+                    </m:sSub>
+                  </m:oMath>
+                </a14:m>
+                <a:endParaRPr lang="en-US" dirty="0"/>
+              </a:p>
+              <a:p>
+                <a:pPr marL="285750" indent="-285750"/>
+                <a:r>
+                  <a:rPr lang="en-US" dirty="0"/>
+                  <a:t>Nested optimization:</a:t>
+                </a:r>
+              </a:p>
+              <a:p>
+                <a:pPr marL="578358" lvl="1" indent="-285750"/>
+                <a:r>
+                  <a:rPr lang="en-US" dirty="0"/>
+                  <a:t>Given estimated </a:t>
+                </a:r>
+                <a14:m>
+                  <m:oMath xmlns:m="http://schemas.openxmlformats.org/officeDocument/2006/math">
+                    <m:sSub>
+                      <m:sSubPr>
+                        <m:ctrlPr>
+                          <a:rPr lang="en-US" i="1">
+                            <a:latin typeface="Cambria Math" panose="02040503050406030204" pitchFamily="18" charset="0"/>
+                            <a:ea typeface="Cambria Math" panose="02040503050406030204" pitchFamily="18" charset="0"/>
+                          </a:rPr>
+                        </m:ctrlPr>
+                      </m:sSubPr>
+                      <m:e>
+                        <m:r>
+                          <a:rPr lang="en-US" i="1">
+                            <a:latin typeface="Cambria Math" panose="02040503050406030204" pitchFamily="18" charset="0"/>
+                            <a:ea typeface="Cambria Math" panose="02040503050406030204" pitchFamily="18" charset="0"/>
+                          </a:rPr>
+                          <m:t>𝑓</m:t>
+                        </m:r>
+                      </m:e>
+                      <m:sub>
+                        <m:r>
+                          <a:rPr lang="en-US" i="1">
+                            <a:latin typeface="Cambria Math" panose="02040503050406030204" pitchFamily="18" charset="0"/>
+                            <a:ea typeface="Cambria Math" panose="02040503050406030204" pitchFamily="18" charset="0"/>
+                          </a:rPr>
+                          <m:t>0</m:t>
+                        </m:r>
+                      </m:sub>
+                    </m:sSub>
+                  </m:oMath>
+                </a14:m>
+                <a:r>
+                  <a:rPr lang="en-US" dirty="0"/>
+                  <a:t> , find optimal coefficients: least square problem</a:t>
+                </a:r>
+              </a:p>
+              <a:p>
+                <a:pPr marL="761238" lvl="2" indent="-285750"/>
+                <a:r>
+                  <a:rPr lang="en-US" dirty="0"/>
+                  <a:t>(Can be solved using linear regression, but you should write your own least squares solver)</a:t>
+                </a:r>
+              </a:p>
+              <a:p>
+                <a:pPr marL="578358" lvl="1" indent="-285750"/>
+                <a:r>
+                  <a:rPr lang="en-US" dirty="0"/>
+                  <a:t>Determine optimal </a:t>
+                </a:r>
+                <a14:m>
+                  <m:oMath xmlns:m="http://schemas.openxmlformats.org/officeDocument/2006/math">
+                    <m:sSub>
+                      <m:sSubPr>
+                        <m:ctrlPr>
+                          <a:rPr lang="en-US" i="1">
+                            <a:latin typeface="Cambria Math" panose="02040503050406030204" pitchFamily="18" charset="0"/>
+                            <a:ea typeface="Cambria Math" panose="02040503050406030204" pitchFamily="18" charset="0"/>
+                          </a:rPr>
+                        </m:ctrlPr>
+                      </m:sSubPr>
+                      <m:e>
+                        <m:r>
+                          <a:rPr lang="en-US" i="1">
+                            <a:latin typeface="Cambria Math" panose="02040503050406030204" pitchFamily="18" charset="0"/>
+                            <a:ea typeface="Cambria Math" panose="02040503050406030204" pitchFamily="18" charset="0"/>
+                          </a:rPr>
+                          <m:t>𝑓</m:t>
+                        </m:r>
+                      </m:e>
+                      <m:sub>
+                        <m:r>
+                          <a:rPr lang="en-US" i="1">
+                            <a:latin typeface="Cambria Math" panose="02040503050406030204" pitchFamily="18" charset="0"/>
+                            <a:ea typeface="Cambria Math" panose="02040503050406030204" pitchFamily="18" charset="0"/>
+                          </a:rPr>
+                          <m:t>0</m:t>
+                        </m:r>
+                      </m:sub>
+                    </m:sSub>
+                  </m:oMath>
+                </a14:m>
+                <a:r>
+                  <a:rPr lang="en-US" dirty="0"/>
+                  <a:t> using gradient descent, using a evaluation function which solves the coefficients for any current </a:t>
+                </a:r>
+                <a14:m>
+                  <m:oMath xmlns:m="http://schemas.openxmlformats.org/officeDocument/2006/math">
+                    <m:sSub>
+                      <m:sSubPr>
+                        <m:ctrlPr>
+                          <a:rPr lang="en-US" i="1">
+                            <a:latin typeface="Cambria Math" panose="02040503050406030204" pitchFamily="18" charset="0"/>
+                            <a:ea typeface="Cambria Math" panose="02040503050406030204" pitchFamily="18" charset="0"/>
+                          </a:rPr>
+                        </m:ctrlPr>
+                      </m:sSubPr>
+                      <m:e>
+                        <m:r>
+                          <a:rPr lang="en-US" i="1">
+                            <a:latin typeface="Cambria Math" panose="02040503050406030204" pitchFamily="18" charset="0"/>
+                            <a:ea typeface="Cambria Math" panose="02040503050406030204" pitchFamily="18" charset="0"/>
+                          </a:rPr>
+                          <m:t>𝑓</m:t>
+                        </m:r>
+                      </m:e>
+                      <m:sub>
+                        <m:r>
+                          <a:rPr lang="en-US" i="1">
+                            <a:latin typeface="Cambria Math" panose="02040503050406030204" pitchFamily="18" charset="0"/>
+                            <a:ea typeface="Cambria Math" panose="02040503050406030204" pitchFamily="18" charset="0"/>
+                          </a:rPr>
+                          <m:t>0</m:t>
+                        </m:r>
+                      </m:sub>
+                    </m:sSub>
+                  </m:oMath>
+                </a14:m>
+                <a:r>
+                  <a:rPr lang="en-US" dirty="0"/>
+                  <a:t> and evaluate the gradient</a:t>
+                </a:r>
+              </a:p>
+              <a:p>
+                <a:pPr marL="578358" lvl="1" indent="-285750"/>
+                <a:endParaRPr lang="en-US" dirty="0"/>
+              </a:p>
+            </p:txBody>
+          </p:sp>
+        </mc:Choice>
+        <mc:Fallback>
+          <p:sp>
+            <p:nvSpPr>
+              <p:cNvPr id="3" name="Content Placeholder 2">
+                <a:extLst>
+                  <a:ext uri="{FF2B5EF4-FFF2-40B4-BE49-F238E27FC236}">
+                    <a16:creationId xmlns:a16="http://schemas.microsoft.com/office/drawing/2014/main" id="{6E3383E9-6575-9F47-A04C-41130FCDEA59}"/>
+                  </a:ext>
+                </a:extLst>
+              </p:cNvPr>
+              <p:cNvSpPr>
+                <a:spLocks noGrp="1" noRot="1" noChangeAspect="1" noMove="1" noResize="1" noEditPoints="1" noAdjustHandles="1" noChangeArrowheads="1" noChangeShapeType="1" noTextEdit="1"/>
+              </p:cNvSpPr>
+              <p:nvPr>
+                <p:ph idx="1"/>
+              </p:nvPr>
+            </p:nvSpPr>
+            <p:spPr>
+              <a:blipFill>
+                <a:blip r:embed="rId2"/>
+                <a:stretch>
+                  <a:fillRect l="-1261" t="-1462"/>
+                </a:stretch>
+              </a:blipFill>
+            </p:spPr>
+            <p:txBody>
+              <a:bodyPr/>
+              <a:lstStyle/>
+              <a:p>
+                <a:r>
+                  <a:rPr lang="en-US">
+                    <a:noFill/>
+                  </a:rPr>
+                  <a:t> </a:t>
+                </a:r>
+              </a:p>
+            </p:txBody>
+          </p:sp>
+        </mc:Fallback>
+      </mc:AlternateContent>
+      <p:sp>
+        <p:nvSpPr>
+          <p:cNvPr id="4" name="Slide Number Placeholder 3">
+            <a:extLst>
+              <a:ext uri="{FF2B5EF4-FFF2-40B4-BE49-F238E27FC236}">
+                <a16:creationId xmlns:a16="http://schemas.microsoft.com/office/drawing/2014/main" id="{30F2DEB6-D2F7-274B-B88B-F0B5788210E1}"/>
+              </a:ext>
+            </a:extLst>
+          </p:cNvPr>
+          <p:cNvSpPr>
+            <a:spLocks noGrp="1"/>
+          </p:cNvSpPr>
+          <p:nvPr>
+            <p:ph type="sldNum" sz="quarter" idx="12"/>
+          </p:nvPr>
+        </p:nvSpPr>
+        <p:spPr/>
+        <p:txBody>
+          <a:bodyPr/>
+          <a:lstStyle/>
+          <a:p>
+            <a:fld id="{629637A9-119A-49DA-BD12-AAC58B377D80}" type="slidenum">
+              <a:rPr lang="en-US" smtClean="0"/>
+              <a:t>51</a:t>
+            </a:fld>
+            <a:endParaRPr lang="en-US" dirty="0"/>
+          </a:p>
+        </p:txBody>
+      </p:sp>
+    </p:spTree>
+    <p:extLst>
+      <p:ext uri="{BB962C8B-B14F-4D97-AF65-F5344CB8AC3E}">
+        <p14:creationId xmlns:p14="http://schemas.microsoft.com/office/powerpoint/2010/main" val="3511230352"/>
+      </p:ext>
+    </p:extLst>
+  </p:cSld>
+  <p:clrMapOvr>
+    <a:masterClrMapping/>
+  </p:clrMapOvr>
+</p:sld>
+</file>
+
+<file path=ppt/slides/slide52.xml><?xml version="1.0" encoding="utf-8"?>
+<p:sld xmlns:a="http://schemas.openxmlformats.org/drawingml/2006/main" xmlns:r="http://schemas.openxmlformats.org/officeDocument/2006/relationships" xmlns:p="http://schemas.openxmlformats.org/presentationml/2006/main">
+  <p:cSld>
+    <p:spTree>
+      <p:nvGrpSpPr>
+        <p:cNvPr id="1" name=""/>
+        <p:cNvGrpSpPr/>
+        <p:nvPr/>
+      </p:nvGrpSpPr>
+      <p:grpSpPr>
+        <a:xfrm>
+          <a:off x="0" y="0"/>
+          <a:ext cx="0" cy="0"/>
+          <a:chOff x="0" y="0"/>
+          <a:chExt cx="0" cy="0"/>
+        </a:xfrm>
+      </p:grpSpPr>
+      <p:sp>
+        <p:nvSpPr>
+          <p:cNvPr id="2" name="Title 1"/>
+          <p:cNvSpPr>
+            <a:spLocks noGrp="1"/>
+          </p:cNvSpPr>
+          <p:nvPr>
+            <p:ph type="title"/>
+          </p:nvPr>
+        </p:nvSpPr>
+        <p:spPr/>
+        <p:txBody>
+          <a:bodyPr/>
+          <a:lstStyle/>
+          <a:p>
+            <a:r>
+              <a:rPr lang="en-US" dirty="0"/>
+              <a:t>What you should know</a:t>
+            </a:r>
+          </a:p>
+        </p:txBody>
+      </p:sp>
+      <p:sp>
+        <p:nvSpPr>
+          <p:cNvPr id="3" name="Content Placeholder 2"/>
+          <p:cNvSpPr>
+            <a:spLocks noGrp="1"/>
+          </p:cNvSpPr>
+          <p:nvPr>
+            <p:ph idx="1"/>
+          </p:nvPr>
+        </p:nvSpPr>
+        <p:spPr/>
+        <p:txBody>
+          <a:bodyPr>
+            <a:normAutofit/>
+          </a:bodyPr>
+          <a:lstStyle/>
+          <a:p>
+            <a:r>
+              <a:rPr lang="en-US" dirty="0"/>
+              <a:t>Identify the objective function, parameters and constraints in an optimization problem</a:t>
+            </a:r>
+          </a:p>
+          <a:p>
+            <a:r>
+              <a:rPr lang="en-US" dirty="0"/>
+              <a:t>Compute the gradient of  a loss function for scalar, vector and matrix parameters</a:t>
+            </a:r>
+          </a:p>
+          <a:p>
+            <a:r>
+              <a:rPr lang="en-US" dirty="0"/>
+              <a:t>Efficiently compute a gradient in python.</a:t>
+            </a:r>
+          </a:p>
+          <a:p>
+            <a:r>
+              <a:rPr lang="en-US" dirty="0"/>
+              <a:t>Write the gradient descent update</a:t>
+            </a:r>
+          </a:p>
+          <a:p>
+            <a:r>
+              <a:rPr lang="en-US" dirty="0"/>
+              <a:t>Describe the effect of the learning rate on convergence</a:t>
+            </a:r>
+          </a:p>
+          <a:p>
+            <a:r>
+              <a:rPr lang="en-US" dirty="0"/>
+              <a:t>Determine if a loss function is convex</a:t>
+            </a:r>
+          </a:p>
+          <a:p>
+            <a:endParaRPr lang="en-US" dirty="0"/>
+          </a:p>
+          <a:p>
+            <a:endParaRPr lang="en-US" dirty="0"/>
+          </a:p>
+          <a:p>
+            <a:endParaRPr lang="en-US" dirty="0"/>
+          </a:p>
+          <a:p>
+            <a:endParaRPr lang="en-US" dirty="0"/>
+          </a:p>
+          <a:p>
+            <a:endParaRPr lang="en-US" dirty="0"/>
+          </a:p>
+          <a:p>
+            <a:endParaRPr lang="en-US" dirty="0"/>
+          </a:p>
+        </p:txBody>
+      </p:sp>
+      <p:sp>
+        <p:nvSpPr>
+          <p:cNvPr id="4" name="Slide Number Placeholder 3"/>
+          <p:cNvSpPr>
+            <a:spLocks noGrp="1"/>
+          </p:cNvSpPr>
+          <p:nvPr>
+            <p:ph type="sldNum" sz="quarter" idx="12"/>
+          </p:nvPr>
+        </p:nvSpPr>
+        <p:spPr/>
+        <p:txBody>
+          <a:bodyPr/>
+          <a:lstStyle/>
+          <a:p>
+            <a:fld id="{629637A9-119A-49DA-BD12-AAC58B377D80}" type="slidenum">
+              <a:rPr lang="en-US" smtClean="0"/>
+              <a:t>52</a:t>
+            </a:fld>
+            <a:endParaRPr lang="en-US" dirty="0"/>
+          </a:p>
+        </p:txBody>
+      </p:sp>
+    </p:spTree>
+    <p:extLst>
+      <p:ext uri="{BB962C8B-B14F-4D97-AF65-F5344CB8AC3E}">
+        <p14:creationId xmlns:p14="http://schemas.microsoft.com/office/powerpoint/2010/main" val="1856179891"/>
+      </p:ext>
+    </p:extLst>
+  </p:cSld>
+  <p:clrMapOvr>
+    <a:masterClrMapping/>
+  </p:clrMapOvr>
+</p:sld>
+</file>
+
 <file path=ppt/slides/slide6.xml><?xml version="1.0" encoding="utf-8"?>
 <p:sld xmlns:a="http://schemas.openxmlformats.org/drawingml/2006/main" xmlns:r="http://schemas.openxmlformats.org/officeDocument/2006/relationships" xmlns:p="http://schemas.openxmlformats.org/presentationml/2006/main">
   <p:cSld>
@@ -31041,8 +33953,8 @@
           </a:p>
         </p:txBody>
       </p:sp>
-      <mc:AlternateContent xmlns:mc="http://schemas.openxmlformats.org/markup-compatibility/2006" xmlns:a14="http://schemas.microsoft.com/office/drawing/2010/main">
-        <mc:Choice Requires="a14">
+      <mc:AlternateContent xmlns:mc="http://schemas.openxmlformats.org/markup-compatibility/2006">
+        <mc:Choice xmlns:a14="http://schemas.microsoft.com/office/drawing/2010/main" Requires="a14">
           <p:sp>
             <p:nvSpPr>
               <p:cNvPr id="3" name="Content Placeholder 2">
@@ -31061,12 +33973,14 @@
             </p:nvSpPr>
             <p:spPr/>
             <p:txBody>
-              <a:bodyPr/>
+              <a:bodyPr>
+                <a:normAutofit/>
+              </a:bodyPr>
               <a:lstStyle/>
               <a:p>
                 <a:r>
                   <a:rPr lang="en-US" dirty="0"/>
-                  <a:t>Assume logistic model:  </a:t>
+                  <a:t>Assume logistic model for the likelihood function:  </a:t>
                 </a:r>
                 <a:br>
                   <a:rPr lang="en-US" b="0" i="1" dirty="0">
@@ -31310,7 +34224,7 @@
               <a:p>
                 <a:r>
                   <a:rPr lang="en-US" dirty="0"/>
-                  <a:t>ML estimation:  Minimize the negative log likelihood:</a:t>
+                  <a:t>ML (Maximum Likelihood) estimation:  Minimize the negative log likelihood:</a:t>
                 </a:r>
                 <a:br>
                   <a:rPr lang="en-US" dirty="0"/>
@@ -31649,7 +34563,7 @@
               <a:p>
                 <a:r>
                   <a:rPr lang="en-US" dirty="0"/>
-                  <a:t>Loss function = binary cross entropy</a:t>
+                  <a:t>Loss function = binary cross entropy (number of classes K=2)</a:t>
                 </a:r>
                 <a:br>
                   <a:rPr lang="en-US" dirty="0"/>
@@ -32020,13 +34934,10 @@
                 </a14:m>
                 <a:endParaRPr lang="en-US" b="0" dirty="0"/>
               </a:p>
-              <a:p>
-                <a:endParaRPr lang="en-US" dirty="0"/>
-              </a:p>
             </p:txBody>
           </p:sp>
         </mc:Choice>
-        <mc:Fallback xmlns="">
+        <mc:Fallback>
           <p:sp>
             <p:nvSpPr>
               <p:cNvPr id="3" name="Content Placeholder 2">
@@ -32047,7 +34958,7 @@
               <a:blipFill>
                 <a:blip r:embed="rId2"/>
                 <a:stretch>
-                  <a:fillRect l="-1455" t="-1549"/>
+                  <a:fillRect l="-1261" t="-1462" b="-26316"/>
                 </a:stretch>
               </a:blipFill>
             </p:spPr>
@@ -32188,7 +35099,7 @@
             </a:r>
             <a:r>
               <a:rPr lang="en-US" dirty="0" err="1"/>
-              <a:t>LogisticClassifier.fit</a:t>
+              <a:t>LogisticRegression.fit</a:t>
             </a:r>
             <a:r>
               <a:rPr lang="en-US" dirty="0"/>
@@ -32210,7 +35121,7 @@
           <a:p>
             <a:r>
               <a:rPr lang="en-US" dirty="0"/>
-              <a:t>Uses built-in optimizer to minimize loss function</a:t>
+              <a:t>Used built-in optimizer to minimize loss function</a:t>
             </a:r>
           </a:p>
           <a:p>

</xml_diff>